<commit_message>
summary of the experiments
</commit_message>
<xml_diff>
--- a/Diabetes/Traditional vs 11 features for prof _V3/Summary of the experiments - with HBP -1.pptx
+++ b/Diabetes/Traditional vs 11 features for prof _V3/Summary of the experiments - with HBP -1.pptx
@@ -6,29 +6,30 @@
   </p:sldMasterIdLst>
   <p:sldIdLst>
     <p:sldId id="256" r:id="rId2"/>
-    <p:sldId id="288" r:id="rId3"/>
-    <p:sldId id="294" r:id="rId4"/>
-    <p:sldId id="291" r:id="rId5"/>
-    <p:sldId id="269" r:id="rId6"/>
-    <p:sldId id="292" r:id="rId7"/>
-    <p:sldId id="270" r:id="rId8"/>
-    <p:sldId id="287" r:id="rId9"/>
-    <p:sldId id="260" r:id="rId10"/>
-    <p:sldId id="293" r:id="rId11"/>
-    <p:sldId id="271" r:id="rId12"/>
-    <p:sldId id="272" r:id="rId13"/>
-    <p:sldId id="273" r:id="rId14"/>
-    <p:sldId id="275" r:id="rId15"/>
-    <p:sldId id="276" r:id="rId16"/>
-    <p:sldId id="277" r:id="rId17"/>
-    <p:sldId id="274" r:id="rId18"/>
-    <p:sldId id="278" r:id="rId19"/>
-    <p:sldId id="279" r:id="rId20"/>
-    <p:sldId id="280" r:id="rId21"/>
-    <p:sldId id="283" r:id="rId22"/>
-    <p:sldId id="284" r:id="rId23"/>
-    <p:sldId id="282" r:id="rId24"/>
-    <p:sldId id="285" r:id="rId25"/>
+    <p:sldId id="295" r:id="rId3"/>
+    <p:sldId id="288" r:id="rId4"/>
+    <p:sldId id="294" r:id="rId5"/>
+    <p:sldId id="291" r:id="rId6"/>
+    <p:sldId id="269" r:id="rId7"/>
+    <p:sldId id="292" r:id="rId8"/>
+    <p:sldId id="270" r:id="rId9"/>
+    <p:sldId id="287" r:id="rId10"/>
+    <p:sldId id="260" r:id="rId11"/>
+    <p:sldId id="293" r:id="rId12"/>
+    <p:sldId id="271" r:id="rId13"/>
+    <p:sldId id="272" r:id="rId14"/>
+    <p:sldId id="273" r:id="rId15"/>
+    <p:sldId id="275" r:id="rId16"/>
+    <p:sldId id="276" r:id="rId17"/>
+    <p:sldId id="277" r:id="rId18"/>
+    <p:sldId id="274" r:id="rId19"/>
+    <p:sldId id="278" r:id="rId20"/>
+    <p:sldId id="279" r:id="rId21"/>
+    <p:sldId id="280" r:id="rId22"/>
+    <p:sldId id="283" r:id="rId23"/>
+    <p:sldId id="284" r:id="rId24"/>
+    <p:sldId id="282" r:id="rId25"/>
+    <p:sldId id="285" r:id="rId26"/>
   </p:sldIdLst>
   <p:sldSz cx="12192000" cy="6858000"/>
   <p:notesSz cx="6858000" cy="9144000"/>
@@ -1656,7 +1657,7 @@
           <a:p>
             <a:fld id="{9715FDF7-3BFC-4CCC-A629-B603D4E58B26}" type="datetimeFigureOut">
               <a:rPr lang="en-US" smtClean="0"/>
-              <a:t>2/22/2020</a:t>
+              <a:t>2/24/2020</a:t>
             </a:fld>
             <a:endParaRPr lang="en-US"/>
           </a:p>
@@ -1854,7 +1855,7 @@
           <a:p>
             <a:fld id="{9715FDF7-3BFC-4CCC-A629-B603D4E58B26}" type="datetimeFigureOut">
               <a:rPr lang="en-US" smtClean="0"/>
-              <a:t>2/22/2020</a:t>
+              <a:t>2/24/2020</a:t>
             </a:fld>
             <a:endParaRPr lang="en-US"/>
           </a:p>
@@ -2062,7 +2063,7 @@
           <a:p>
             <a:fld id="{9715FDF7-3BFC-4CCC-A629-B603D4E58B26}" type="datetimeFigureOut">
               <a:rPr lang="en-US" smtClean="0"/>
-              <a:t>2/22/2020</a:t>
+              <a:t>2/24/2020</a:t>
             </a:fld>
             <a:endParaRPr lang="en-US"/>
           </a:p>
@@ -2260,7 +2261,7 @@
           <a:p>
             <a:fld id="{9715FDF7-3BFC-4CCC-A629-B603D4E58B26}" type="datetimeFigureOut">
               <a:rPr lang="en-US" smtClean="0"/>
-              <a:t>2/22/2020</a:t>
+              <a:t>2/24/2020</a:t>
             </a:fld>
             <a:endParaRPr lang="en-US"/>
           </a:p>
@@ -2535,7 +2536,7 @@
           <a:p>
             <a:fld id="{9715FDF7-3BFC-4CCC-A629-B603D4E58B26}" type="datetimeFigureOut">
               <a:rPr lang="en-US" smtClean="0"/>
-              <a:t>2/22/2020</a:t>
+              <a:t>2/24/2020</a:t>
             </a:fld>
             <a:endParaRPr lang="en-US"/>
           </a:p>
@@ -2800,7 +2801,7 @@
           <a:p>
             <a:fld id="{9715FDF7-3BFC-4CCC-A629-B603D4E58B26}" type="datetimeFigureOut">
               <a:rPr lang="en-US" smtClean="0"/>
-              <a:t>2/22/2020</a:t>
+              <a:t>2/24/2020</a:t>
             </a:fld>
             <a:endParaRPr lang="en-US"/>
           </a:p>
@@ -3212,7 +3213,7 @@
           <a:p>
             <a:fld id="{9715FDF7-3BFC-4CCC-A629-B603D4E58B26}" type="datetimeFigureOut">
               <a:rPr lang="en-US" smtClean="0"/>
-              <a:t>2/22/2020</a:t>
+              <a:t>2/24/2020</a:t>
             </a:fld>
             <a:endParaRPr lang="en-US"/>
           </a:p>
@@ -3353,7 +3354,7 @@
           <a:p>
             <a:fld id="{9715FDF7-3BFC-4CCC-A629-B603D4E58B26}" type="datetimeFigureOut">
               <a:rPr lang="en-US" smtClean="0"/>
-              <a:t>2/22/2020</a:t>
+              <a:t>2/24/2020</a:t>
             </a:fld>
             <a:endParaRPr lang="en-US"/>
           </a:p>
@@ -3466,7 +3467,7 @@
           <a:p>
             <a:fld id="{9715FDF7-3BFC-4CCC-A629-B603D4E58B26}" type="datetimeFigureOut">
               <a:rPr lang="en-US" smtClean="0"/>
-              <a:t>2/22/2020</a:t>
+              <a:t>2/24/2020</a:t>
             </a:fld>
             <a:endParaRPr lang="en-US"/>
           </a:p>
@@ -3777,7 +3778,7 @@
           <a:p>
             <a:fld id="{9715FDF7-3BFC-4CCC-A629-B603D4E58B26}" type="datetimeFigureOut">
               <a:rPr lang="en-US" smtClean="0"/>
-              <a:t>2/22/2020</a:t>
+              <a:t>2/24/2020</a:t>
             </a:fld>
             <a:endParaRPr lang="en-US"/>
           </a:p>
@@ -4065,7 +4066,7 @@
           <a:p>
             <a:fld id="{9715FDF7-3BFC-4CCC-A629-B603D4E58B26}" type="datetimeFigureOut">
               <a:rPr lang="en-US" smtClean="0"/>
-              <a:t>2/22/2020</a:t>
+              <a:t>2/24/2020</a:t>
             </a:fld>
             <a:endParaRPr lang="en-US"/>
           </a:p>
@@ -4306,7 +4307,7 @@
           <a:p>
             <a:fld id="{9715FDF7-3BFC-4CCC-A629-B603D4E58B26}" type="datetimeFigureOut">
               <a:rPr lang="en-US" smtClean="0"/>
-              <a:t>2/22/2020</a:t>
+              <a:t>2/24/2020</a:t>
             </a:fld>
             <a:endParaRPr lang="en-US"/>
           </a:p>
@@ -4811,6 +4812,669 @@
           <p:cNvPr id="2" name="Title 1">
             <a:extLst>
               <a:ext uri="{FF2B5EF4-FFF2-40B4-BE49-F238E27FC236}">
+                <a16:creationId xmlns:a16="http://schemas.microsoft.com/office/drawing/2014/main" id="{FC8DD7DB-3341-4461-8871-D4E9C8AEDD5C}"/>
+              </a:ext>
+            </a:extLst>
+          </p:cNvPr>
+          <p:cNvSpPr>
+            <a:spLocks noGrp="1"/>
+          </p:cNvSpPr>
+          <p:nvPr>
+            <p:ph type="title"/>
+          </p:nvPr>
+        </p:nvSpPr>
+        <p:spPr/>
+        <p:txBody>
+          <a:bodyPr>
+            <a:normAutofit/>
+          </a:bodyPr>
+          <a:lstStyle/>
+          <a:p>
+            <a:r>
+              <a:rPr lang="en-US" sz="3600" dirty="0">
+                <a:latin typeface="Times New Roman" panose="02020603050405020304" pitchFamily="18" charset="0"/>
+                <a:cs typeface="Times New Roman" panose="02020603050405020304" pitchFamily="18" charset="0"/>
+              </a:rPr>
+              <a:t>3. Ensemble Approach</a:t>
+            </a:r>
+          </a:p>
+        </p:txBody>
+      </p:sp>
+      <p:sp>
+        <p:nvSpPr>
+          <p:cNvPr id="3" name="Content Placeholder 2">
+            <a:extLst>
+              <a:ext uri="{FF2B5EF4-FFF2-40B4-BE49-F238E27FC236}">
+                <a16:creationId xmlns:a16="http://schemas.microsoft.com/office/drawing/2014/main" id="{6502C41E-3444-4C0E-AC3D-139CC7E8D8AA}"/>
+              </a:ext>
+            </a:extLst>
+          </p:cNvPr>
+          <p:cNvSpPr>
+            <a:spLocks noGrp="1"/>
+          </p:cNvSpPr>
+          <p:nvPr>
+            <p:ph idx="1"/>
+          </p:nvPr>
+        </p:nvSpPr>
+        <p:spPr>
+          <a:xfrm>
+            <a:off x="838201" y="1825625"/>
+            <a:ext cx="5842518" cy="4351338"/>
+          </a:xfrm>
+        </p:spPr>
+        <p:txBody>
+          <a:bodyPr>
+            <a:normAutofit/>
+          </a:bodyPr>
+          <a:lstStyle/>
+          <a:p>
+            <a:pPr>
+              <a:buFont typeface="Wingdings" panose="05000000000000000000" pitchFamily="2" charset="2"/>
+              <a:buChar char="§"/>
+            </a:pPr>
+            <a:r>
+              <a:rPr lang="en-US" sz="1800" dirty="0">
+                <a:latin typeface="Times New Roman" panose="02020603050405020304" pitchFamily="18" charset="0"/>
+                <a:cs typeface="Times New Roman" panose="02020603050405020304" pitchFamily="18" charset="0"/>
+              </a:rPr>
+              <a:t>In this sub section, top 5 more accurate models from each feature sets are selected and ensembled using </a:t>
+            </a:r>
+          </a:p>
+          <a:p>
+            <a:pPr lvl="1">
+              <a:buFont typeface="Wingdings" panose="05000000000000000000" pitchFamily="2" charset="2"/>
+              <a:buChar char="ü"/>
+            </a:pPr>
+            <a:r>
+              <a:rPr lang="en-US" sz="1600" dirty="0">
+                <a:latin typeface="Times New Roman" panose="02020603050405020304" pitchFamily="18" charset="0"/>
+                <a:cs typeface="Times New Roman" panose="02020603050405020304" pitchFamily="18" charset="0"/>
+              </a:rPr>
+              <a:t>Stacking classifier</a:t>
+            </a:r>
+          </a:p>
+          <a:p>
+            <a:pPr lvl="1">
+              <a:buFont typeface="Wingdings" panose="05000000000000000000" pitchFamily="2" charset="2"/>
+              <a:buChar char="ü"/>
+            </a:pPr>
+            <a:r>
+              <a:rPr lang="en-US" sz="1600" dirty="0">
+                <a:latin typeface="Times New Roman" panose="02020603050405020304" pitchFamily="18" charset="0"/>
+                <a:cs typeface="Times New Roman" panose="02020603050405020304" pitchFamily="18" charset="0"/>
+              </a:rPr>
+              <a:t>Soft voting classifier</a:t>
+            </a:r>
+          </a:p>
+          <a:p>
+            <a:pPr lvl="1">
+              <a:buFont typeface="Wingdings" panose="05000000000000000000" pitchFamily="2" charset="2"/>
+              <a:buChar char="ü"/>
+            </a:pPr>
+            <a:r>
+              <a:rPr lang="en-US" sz="1600" dirty="0">
+                <a:latin typeface="Times New Roman" panose="02020603050405020304" pitchFamily="18" charset="0"/>
+                <a:cs typeface="Times New Roman" panose="02020603050405020304" pitchFamily="18" charset="0"/>
+              </a:rPr>
+              <a:t>Hard voting classifier</a:t>
+            </a:r>
+          </a:p>
+          <a:p>
+            <a:pPr>
+              <a:buFont typeface="Wingdings" panose="05000000000000000000" pitchFamily="2" charset="2"/>
+              <a:buChar char="§"/>
+            </a:pPr>
+            <a:r>
+              <a:rPr lang="en-US" sz="1800" dirty="0">
+                <a:latin typeface="Times New Roman" panose="02020603050405020304" pitchFamily="18" charset="0"/>
+                <a:cs typeface="Times New Roman" panose="02020603050405020304" pitchFamily="18" charset="0"/>
+              </a:rPr>
+              <a:t>The algorithms used in this experiment are</a:t>
+            </a:r>
+          </a:p>
+          <a:p>
+            <a:pPr lvl="1">
+              <a:buFont typeface="Wingdings" panose="05000000000000000000" pitchFamily="2" charset="2"/>
+              <a:buChar char="ü"/>
+            </a:pPr>
+            <a:r>
+              <a:rPr lang="en-US" sz="1600" dirty="0">
+                <a:latin typeface="Times New Roman" panose="02020603050405020304" pitchFamily="18" charset="0"/>
+                <a:cs typeface="Times New Roman" panose="02020603050405020304" pitchFamily="18" charset="0"/>
+              </a:rPr>
+              <a:t>RF</a:t>
+            </a:r>
+          </a:p>
+          <a:p>
+            <a:pPr lvl="1">
+              <a:buFont typeface="Wingdings" panose="05000000000000000000" pitchFamily="2" charset="2"/>
+              <a:buChar char="ü"/>
+            </a:pPr>
+            <a:r>
+              <a:rPr lang="en-US" sz="1600" dirty="0">
+                <a:latin typeface="Times New Roman" panose="02020603050405020304" pitchFamily="18" charset="0"/>
+                <a:cs typeface="Times New Roman" panose="02020603050405020304" pitchFamily="18" charset="0"/>
+              </a:rPr>
+              <a:t>SVM</a:t>
+            </a:r>
+          </a:p>
+          <a:p>
+            <a:pPr lvl="1">
+              <a:buFont typeface="Wingdings" panose="05000000000000000000" pitchFamily="2" charset="2"/>
+              <a:buChar char="ü"/>
+            </a:pPr>
+            <a:r>
+              <a:rPr lang="en-US" sz="1600" dirty="0" err="1">
+                <a:latin typeface="Times New Roman" panose="02020603050405020304" pitchFamily="18" charset="0"/>
+                <a:cs typeface="Times New Roman" panose="02020603050405020304" pitchFamily="18" charset="0"/>
+              </a:rPr>
+              <a:t>XGBoost</a:t>
+            </a:r>
+            <a:endParaRPr lang="en-US" sz="1600" dirty="0">
+              <a:latin typeface="Times New Roman" panose="02020603050405020304" pitchFamily="18" charset="0"/>
+              <a:cs typeface="Times New Roman" panose="02020603050405020304" pitchFamily="18" charset="0"/>
+            </a:endParaRPr>
+          </a:p>
+          <a:p>
+            <a:pPr>
+              <a:buFont typeface="Wingdings" panose="05000000000000000000" pitchFamily="2" charset="2"/>
+              <a:buChar char="§"/>
+            </a:pPr>
+            <a:r>
+              <a:rPr lang="en-US" sz="1800" dirty="0">
+                <a:latin typeface="Times New Roman" panose="02020603050405020304" pitchFamily="18" charset="0"/>
+                <a:cs typeface="Times New Roman" panose="02020603050405020304" pitchFamily="18" charset="0"/>
+              </a:rPr>
+              <a:t>A total of </a:t>
+            </a:r>
+            <a:r>
+              <a:rPr lang="en-US" sz="1800" b="1" dirty="0">
+                <a:latin typeface="Times New Roman" panose="02020603050405020304" pitchFamily="18" charset="0"/>
+                <a:cs typeface="Times New Roman" panose="02020603050405020304" pitchFamily="18" charset="0"/>
+              </a:rPr>
+              <a:t>15 models </a:t>
+            </a:r>
+            <a:r>
+              <a:rPr lang="en-US" sz="1800" dirty="0">
+                <a:latin typeface="Times New Roman" panose="02020603050405020304" pitchFamily="18" charset="0"/>
+                <a:cs typeface="Times New Roman" panose="02020603050405020304" pitchFamily="18" charset="0"/>
+              </a:rPr>
+              <a:t>are used for each ensemble technique </a:t>
+            </a:r>
+          </a:p>
+        </p:txBody>
+      </p:sp>
+      <p:grpSp>
+        <p:nvGrpSpPr>
+          <p:cNvPr id="5" name="Group 4">
+            <a:extLst>
+              <a:ext uri="{FF2B5EF4-FFF2-40B4-BE49-F238E27FC236}">
+                <a16:creationId xmlns:a16="http://schemas.microsoft.com/office/drawing/2014/main" id="{B1190059-9CA3-491B-A6B4-4CB2216D0971}"/>
+              </a:ext>
+            </a:extLst>
+          </p:cNvPr>
+          <p:cNvGrpSpPr/>
+          <p:nvPr/>
+        </p:nvGrpSpPr>
+        <p:grpSpPr>
+          <a:xfrm>
+            <a:off x="7900797" y="1149015"/>
+            <a:ext cx="3697831" cy="2692022"/>
+            <a:chOff x="7919458" y="1419603"/>
+            <a:chExt cx="3697831" cy="2692022"/>
+          </a:xfrm>
+        </p:grpSpPr>
+        <p:pic>
+          <p:nvPicPr>
+            <p:cNvPr id="2050" name="Picture 2" descr="Image result for stacking classifier">
+              <a:extLst>
+                <a:ext uri="{FF2B5EF4-FFF2-40B4-BE49-F238E27FC236}">
+                  <a16:creationId xmlns:a16="http://schemas.microsoft.com/office/drawing/2014/main" id="{3D9811A9-CF50-46BA-80FA-5FD6DEEA2D80}"/>
+                </a:ext>
+              </a:extLst>
+            </p:cNvPr>
+            <p:cNvPicPr>
+              <a:picLocks noChangeAspect="1" noChangeArrowheads="1"/>
+            </p:cNvPicPr>
+            <p:nvPr/>
+          </p:nvPicPr>
+          <p:blipFill>
+            <a:blip r:embed="rId2">
+              <a:extLst>
+                <a:ext uri="{28A0092B-C50C-407E-A947-70E740481C1C}">
+                  <a14:useLocalDpi xmlns:a14="http://schemas.microsoft.com/office/drawing/2010/main" val="0"/>
+                </a:ext>
+              </a:extLst>
+            </a:blip>
+            <a:srcRect/>
+            <a:stretch>
+              <a:fillRect/>
+            </a:stretch>
+          </p:blipFill>
+          <p:spPr bwMode="auto">
+            <a:xfrm>
+              <a:off x="8456048" y="1825625"/>
+              <a:ext cx="3161241" cy="2286000"/>
+            </a:xfrm>
+            <a:prstGeom prst="rect">
+              <a:avLst/>
+            </a:prstGeom>
+            <a:noFill/>
+            <a:extLst>
+              <a:ext uri="{909E8E84-426E-40DD-AFC4-6F175D3DCCD1}">
+                <a14:hiddenFill xmlns:a14="http://schemas.microsoft.com/office/drawing/2010/main">
+                  <a:solidFill>
+                    <a:srgbClr val="FFFFFF"/>
+                  </a:solidFill>
+                </a14:hiddenFill>
+              </a:ext>
+            </a:extLst>
+          </p:spPr>
+        </p:pic>
+        <p:sp>
+          <p:nvSpPr>
+            <p:cNvPr id="4" name="Rectangle 3">
+              <a:extLst>
+                <a:ext uri="{FF2B5EF4-FFF2-40B4-BE49-F238E27FC236}">
+                  <a16:creationId xmlns:a16="http://schemas.microsoft.com/office/drawing/2014/main" id="{4F68E110-D532-4FAD-AD6F-2570FC8A6D67}"/>
+                </a:ext>
+              </a:extLst>
+            </p:cNvPr>
+            <p:cNvSpPr/>
+            <p:nvPr/>
+          </p:nvSpPr>
+          <p:spPr>
+            <a:xfrm>
+              <a:off x="7919458" y="1419603"/>
+              <a:ext cx="2162772" cy="338554"/>
+            </a:xfrm>
+            <a:prstGeom prst="rect">
+              <a:avLst/>
+            </a:prstGeom>
+          </p:spPr>
+          <p:txBody>
+            <a:bodyPr wrap="none">
+              <a:spAutoFit/>
+            </a:bodyPr>
+            <a:lstStyle/>
+            <a:p>
+              <a:pPr lvl="1"/>
+              <a:r>
+                <a:rPr lang="en-US" sz="1600" dirty="0">
+                  <a:latin typeface="Times New Roman" panose="02020603050405020304" pitchFamily="18" charset="0"/>
+                  <a:cs typeface="Times New Roman" panose="02020603050405020304" pitchFamily="18" charset="0"/>
+                </a:rPr>
+                <a:t>Stacking classifier</a:t>
+              </a:r>
+            </a:p>
+          </p:txBody>
+        </p:sp>
+      </p:grpSp>
+      <p:pic>
+        <p:nvPicPr>
+          <p:cNvPr id="2052" name="Picture 4" descr="Image result for voting classifier">
+            <a:extLst>
+              <a:ext uri="{FF2B5EF4-FFF2-40B4-BE49-F238E27FC236}">
+                <a16:creationId xmlns:a16="http://schemas.microsoft.com/office/drawing/2014/main" id="{E1F77B17-2BB5-433A-9A23-AF6B1FA97854}"/>
+              </a:ext>
+            </a:extLst>
+          </p:cNvPr>
+          <p:cNvPicPr>
+            <a:picLocks noChangeAspect="1" noChangeArrowheads="1"/>
+          </p:cNvPicPr>
+          <p:nvPr/>
+        </p:nvPicPr>
+        <p:blipFill>
+          <a:blip r:embed="rId3">
+            <a:extLst>
+              <a:ext uri="{28A0092B-C50C-407E-A947-70E740481C1C}">
+                <a14:useLocalDpi xmlns:a14="http://schemas.microsoft.com/office/drawing/2010/main" val="0"/>
+              </a:ext>
+            </a:extLst>
+          </a:blip>
+          <a:srcRect/>
+          <a:stretch>
+            <a:fillRect/>
+          </a:stretch>
+        </p:blipFill>
+        <p:spPr bwMode="auto">
+          <a:xfrm>
+            <a:off x="7620000" y="4512421"/>
+            <a:ext cx="4572000" cy="1739183"/>
+          </a:xfrm>
+          <a:prstGeom prst="rect">
+            <a:avLst/>
+          </a:prstGeom>
+          <a:noFill/>
+          <a:extLst>
+            <a:ext uri="{909E8E84-426E-40DD-AFC4-6F175D3DCCD1}">
+              <a14:hiddenFill xmlns:a14="http://schemas.microsoft.com/office/drawing/2010/main">
+                <a:solidFill>
+                  <a:srgbClr val="FFFFFF"/>
+                </a:solidFill>
+              </a14:hiddenFill>
+            </a:ext>
+          </a:extLst>
+        </p:spPr>
+      </p:pic>
+      <p:sp>
+        <p:nvSpPr>
+          <p:cNvPr id="6" name="Rectangle 5">
+            <a:extLst>
+              <a:ext uri="{FF2B5EF4-FFF2-40B4-BE49-F238E27FC236}">
+                <a16:creationId xmlns:a16="http://schemas.microsoft.com/office/drawing/2014/main" id="{B31F861F-8F00-41BB-ABF3-4056F9CDD92E}"/>
+              </a:ext>
+            </a:extLst>
+          </p:cNvPr>
+          <p:cNvSpPr/>
+          <p:nvPr/>
+        </p:nvSpPr>
+        <p:spPr>
+          <a:xfrm>
+            <a:off x="8437387" y="4143089"/>
+            <a:ext cx="1623265" cy="369332"/>
+          </a:xfrm>
+          <a:prstGeom prst="rect">
+            <a:avLst/>
+          </a:prstGeom>
+        </p:spPr>
+        <p:txBody>
+          <a:bodyPr wrap="none">
+            <a:spAutoFit/>
+          </a:bodyPr>
+          <a:lstStyle/>
+          <a:p>
+            <a:r>
+              <a:rPr lang="en-US" dirty="0">
+                <a:latin typeface="Times New Roman" panose="02020603050405020304" pitchFamily="18" charset="0"/>
+                <a:cs typeface="Times New Roman" panose="02020603050405020304" pitchFamily="18" charset="0"/>
+              </a:rPr>
+              <a:t>Voting </a:t>
+            </a:r>
+            <a:r>
+              <a:rPr lang="en-US" dirty="0" err="1">
+                <a:latin typeface="Times New Roman" panose="02020603050405020304" pitchFamily="18" charset="0"/>
+                <a:cs typeface="Times New Roman" panose="02020603050405020304" pitchFamily="18" charset="0"/>
+              </a:rPr>
+              <a:t>classifer</a:t>
+            </a:r>
+            <a:endParaRPr lang="en-US" dirty="0"/>
+          </a:p>
+        </p:txBody>
+      </p:sp>
+      <p:graphicFrame>
+        <p:nvGraphicFramePr>
+          <p:cNvPr id="9" name="Table 7">
+            <a:extLst>
+              <a:ext uri="{FF2B5EF4-FFF2-40B4-BE49-F238E27FC236}">
+                <a16:creationId xmlns:a16="http://schemas.microsoft.com/office/drawing/2014/main" id="{F8EEFDAA-1FC3-450A-9781-0F883B78F5C1}"/>
+              </a:ext>
+            </a:extLst>
+          </p:cNvPr>
+          <p:cNvGraphicFramePr>
+            <a:graphicFrameLocks noGrp="1"/>
+          </p:cNvGraphicFramePr>
+          <p:nvPr>
+            <p:extLst>
+              <p:ext uri="{D42A27DB-BD31-4B8C-83A1-F6EECF244321}">
+                <p14:modId xmlns:p14="http://schemas.microsoft.com/office/powerpoint/2010/main" val="1703930747"/>
+              </p:ext>
+            </p:extLst>
+          </p:nvPr>
+        </p:nvGraphicFramePr>
+        <p:xfrm>
+          <a:off x="1204761" y="5090330"/>
+          <a:ext cx="3890646" cy="1483360"/>
+        </p:xfrm>
+        <a:graphic>
+          <a:graphicData uri="http://schemas.openxmlformats.org/drawingml/2006/table">
+            <a:tbl>
+              <a:tblPr firstRow="1" bandRow="1">
+                <a:tableStyleId>{5C22544A-7EE6-4342-B048-85BDC9FD1C3A}</a:tableStyleId>
+              </a:tblPr>
+              <a:tblGrid>
+                <a:gridCol w="1336675">
+                  <a:extLst>
+                    <a:ext uri="{9D8B030D-6E8A-4147-A177-3AD203B41FA5}">
+                      <a16:colId xmlns:a16="http://schemas.microsoft.com/office/drawing/2014/main" val="1368218454"/>
+                    </a:ext>
+                  </a:extLst>
+                </a:gridCol>
+                <a:gridCol w="1323404">
+                  <a:extLst>
+                    <a:ext uri="{9D8B030D-6E8A-4147-A177-3AD203B41FA5}">
+                      <a16:colId xmlns:a16="http://schemas.microsoft.com/office/drawing/2014/main" val="3411469074"/>
+                    </a:ext>
+                  </a:extLst>
+                </a:gridCol>
+                <a:gridCol w="1230567">
+                  <a:extLst>
+                    <a:ext uri="{9D8B030D-6E8A-4147-A177-3AD203B41FA5}">
+                      <a16:colId xmlns:a16="http://schemas.microsoft.com/office/drawing/2014/main" val="1879159377"/>
+                    </a:ext>
+                  </a:extLst>
+                </a:gridCol>
+              </a:tblGrid>
+              <a:tr h="370840">
+                <a:tc>
+                  <a:txBody>
+                    <a:bodyPr/>
+                    <a:lstStyle/>
+                    <a:p>
+                      <a:endParaRPr lang="en-US" dirty="0"/>
+                    </a:p>
+                  </a:txBody>
+                  <a:tcPr/>
+                </a:tc>
+                <a:tc>
+                  <a:txBody>
+                    <a:bodyPr/>
+                    <a:lstStyle/>
+                    <a:p>
+                      <a:r>
+                        <a:rPr lang="en-US" dirty="0"/>
+                        <a:t>Training set</a:t>
+                      </a:r>
+                    </a:p>
+                  </a:txBody>
+                  <a:tcPr/>
+                </a:tc>
+                <a:tc>
+                  <a:txBody>
+                    <a:bodyPr/>
+                    <a:lstStyle/>
+                    <a:p>
+                      <a:r>
+                        <a:rPr lang="en-US" dirty="0"/>
+                        <a:t>Testing set</a:t>
+                      </a:r>
+                    </a:p>
+                  </a:txBody>
+                  <a:tcPr/>
+                </a:tc>
+                <a:extLst>
+                  <a:ext uri="{0D108BD9-81ED-4DB2-BD59-A6C34878D82A}">
+                    <a16:rowId xmlns:a16="http://schemas.microsoft.com/office/drawing/2014/main" val="2561022447"/>
+                  </a:ext>
+                </a:extLst>
+              </a:tr>
+              <a:tr h="370840">
+                <a:tc>
+                  <a:txBody>
+                    <a:bodyPr/>
+                    <a:lstStyle/>
+                    <a:p>
+                      <a:r>
+                        <a:rPr lang="en-US" dirty="0"/>
+                        <a:t>Diabetes</a:t>
+                      </a:r>
+                    </a:p>
+                  </a:txBody>
+                  <a:tcPr/>
+                </a:tc>
+                <a:tc>
+                  <a:txBody>
+                    <a:bodyPr/>
+                    <a:lstStyle/>
+                    <a:p>
+                      <a:r>
+                        <a:rPr lang="en-US" dirty="0"/>
+                        <a:t>20,315 </a:t>
+                      </a:r>
+                    </a:p>
+                  </a:txBody>
+                  <a:tcPr/>
+                </a:tc>
+                <a:tc>
+                  <a:txBody>
+                    <a:bodyPr/>
+                    <a:lstStyle/>
+                    <a:p>
+                      <a:r>
+                        <a:rPr lang="en-US" dirty="0"/>
+                        <a:t>200</a:t>
+                      </a:r>
+                    </a:p>
+                  </a:txBody>
+                  <a:tcPr/>
+                </a:tc>
+                <a:extLst>
+                  <a:ext uri="{0D108BD9-81ED-4DB2-BD59-A6C34878D82A}">
+                    <a16:rowId xmlns:a16="http://schemas.microsoft.com/office/drawing/2014/main" val="679388349"/>
+                  </a:ext>
+                </a:extLst>
+              </a:tr>
+              <a:tr h="370840">
+                <a:tc>
+                  <a:txBody>
+                    <a:bodyPr/>
+                    <a:lstStyle/>
+                    <a:p>
+                      <a:r>
+                        <a:rPr lang="en-US" dirty="0"/>
+                        <a:t>Prediabetes</a:t>
+                      </a:r>
+                    </a:p>
+                  </a:txBody>
+                  <a:tcPr/>
+                </a:tc>
+                <a:tc>
+                  <a:txBody>
+                    <a:bodyPr/>
+                    <a:lstStyle/>
+                    <a:p>
+                      <a:r>
+                        <a:rPr lang="en-US" dirty="0"/>
+                        <a:t>20,315 </a:t>
+                      </a:r>
+                    </a:p>
+                  </a:txBody>
+                  <a:tcPr/>
+                </a:tc>
+                <a:tc>
+                  <a:txBody>
+                    <a:bodyPr/>
+                    <a:lstStyle/>
+                    <a:p>
+                      <a:r>
+                        <a:rPr lang="en-US" dirty="0"/>
+                        <a:t>200</a:t>
+                      </a:r>
+                    </a:p>
+                  </a:txBody>
+                  <a:tcPr/>
+                </a:tc>
+                <a:extLst>
+                  <a:ext uri="{0D108BD9-81ED-4DB2-BD59-A6C34878D82A}">
+                    <a16:rowId xmlns:a16="http://schemas.microsoft.com/office/drawing/2014/main" val="1139918692"/>
+                  </a:ext>
+                </a:extLst>
+              </a:tr>
+              <a:tr h="370840">
+                <a:tc>
+                  <a:txBody>
+                    <a:bodyPr/>
+                    <a:lstStyle/>
+                    <a:p>
+                      <a:r>
+                        <a:rPr lang="en-US" dirty="0"/>
+                        <a:t>Normal</a:t>
+                      </a:r>
+                    </a:p>
+                  </a:txBody>
+                  <a:tcPr/>
+                </a:tc>
+                <a:tc>
+                  <a:txBody>
+                    <a:bodyPr/>
+                    <a:lstStyle/>
+                    <a:p>
+                      <a:r>
+                        <a:rPr lang="en-US" dirty="0"/>
+                        <a:t>20,315 </a:t>
+                      </a:r>
+                    </a:p>
+                  </a:txBody>
+                  <a:tcPr/>
+                </a:tc>
+                <a:tc>
+                  <a:txBody>
+                    <a:bodyPr/>
+                    <a:lstStyle/>
+                    <a:p>
+                      <a:r>
+                        <a:rPr lang="en-US" dirty="0"/>
+                        <a:t>200</a:t>
+                      </a:r>
+                    </a:p>
+                  </a:txBody>
+                  <a:tcPr/>
+                </a:tc>
+                <a:extLst>
+                  <a:ext uri="{0D108BD9-81ED-4DB2-BD59-A6C34878D82A}">
+                    <a16:rowId xmlns:a16="http://schemas.microsoft.com/office/drawing/2014/main" val="339788541"/>
+                  </a:ext>
+                </a:extLst>
+              </a:tr>
+            </a:tbl>
+          </a:graphicData>
+        </a:graphic>
+      </p:graphicFrame>
+    </p:spTree>
+    <p:extLst>
+      <p:ext uri="{BB962C8B-B14F-4D97-AF65-F5344CB8AC3E}">
+        <p14:creationId xmlns:p14="http://schemas.microsoft.com/office/powerpoint/2010/main" val="2861797823"/>
+      </p:ext>
+    </p:extLst>
+  </p:cSld>
+  <p:clrMapOvr>
+    <a:masterClrMapping/>
+  </p:clrMapOvr>
+</p:sld>
+</file>
+
+<file path=ppt/slides/slide11.xml><?xml version="1.0" encoding="utf-8"?>
+<p:sld xmlns:a="http://schemas.openxmlformats.org/drawingml/2006/main" xmlns:r="http://schemas.openxmlformats.org/officeDocument/2006/relationships" xmlns:p="http://schemas.openxmlformats.org/presentationml/2006/main">
+  <p:cSld>
+    <p:spTree>
+      <p:nvGrpSpPr>
+        <p:cNvPr id="1" name=""/>
+        <p:cNvGrpSpPr/>
+        <p:nvPr/>
+      </p:nvGrpSpPr>
+      <p:grpSpPr>
+        <a:xfrm>
+          <a:off x="0" y="0"/>
+          <a:ext cx="0" cy="0"/>
+          <a:chOff x="0" y="0"/>
+          <a:chExt cx="0" cy="0"/>
+        </a:xfrm>
+      </p:grpSpPr>
+      <p:sp>
+        <p:nvSpPr>
+          <p:cNvPr id="2" name="Title 1">
+            <a:extLst>
+              <a:ext uri="{FF2B5EF4-FFF2-40B4-BE49-F238E27FC236}">
                 <a16:creationId xmlns:a16="http://schemas.microsoft.com/office/drawing/2014/main" id="{BFB8AA3A-CDDD-45F2-8EDD-AA4FA5311247}"/>
               </a:ext>
             </a:extLst>
@@ -4884,7 +5548,7 @@
 </p:sld>
 </file>
 
-<file path=ppt/slides/slide11.xml><?xml version="1.0" encoding="utf-8"?>
+<file path=ppt/slides/slide12.xml><?xml version="1.0" encoding="utf-8"?>
 <p:sld xmlns:a="http://schemas.openxmlformats.org/drawingml/2006/main" xmlns:r="http://schemas.openxmlformats.org/officeDocument/2006/relationships" xmlns:p="http://schemas.openxmlformats.org/presentationml/2006/main">
   <p:cSld>
     <p:spTree>
@@ -5870,7 +6534,7 @@
 </p:sld>
 </file>
 
-<file path=ppt/slides/slide12.xml><?xml version="1.0" encoding="utf-8"?>
+<file path=ppt/slides/slide13.xml><?xml version="1.0" encoding="utf-8"?>
 <p:sld xmlns:a="http://schemas.openxmlformats.org/drawingml/2006/main" xmlns:r="http://schemas.openxmlformats.org/officeDocument/2006/relationships" xmlns:p="http://schemas.openxmlformats.org/presentationml/2006/main">
   <p:cSld>
     <p:spTree>
@@ -6812,7 +7476,7 @@
 </p:sld>
 </file>
 
-<file path=ppt/slides/slide13.xml><?xml version="1.0" encoding="utf-8"?>
+<file path=ppt/slides/slide14.xml><?xml version="1.0" encoding="utf-8"?>
 <p:sld xmlns:a="http://schemas.openxmlformats.org/drawingml/2006/main" xmlns:r="http://schemas.openxmlformats.org/officeDocument/2006/relationships" xmlns:p="http://schemas.openxmlformats.org/presentationml/2006/main">
   <p:cSld>
     <p:spTree>
@@ -7788,7 +8452,7 @@
 </p:sld>
 </file>
 
-<file path=ppt/slides/slide14.xml><?xml version="1.0" encoding="utf-8"?>
+<file path=ppt/slides/slide15.xml><?xml version="1.0" encoding="utf-8"?>
 <p:sld xmlns:a="http://schemas.openxmlformats.org/drawingml/2006/main" xmlns:r="http://schemas.openxmlformats.org/officeDocument/2006/relationships" xmlns:p="http://schemas.openxmlformats.org/presentationml/2006/main">
   <p:cSld>
     <p:spTree>
@@ -8764,7 +9428,7 @@
 </p:sld>
 </file>
 
-<file path=ppt/slides/slide15.xml><?xml version="1.0" encoding="utf-8"?>
+<file path=ppt/slides/slide16.xml><?xml version="1.0" encoding="utf-8"?>
 <p:sld xmlns:a="http://schemas.openxmlformats.org/drawingml/2006/main" xmlns:r="http://schemas.openxmlformats.org/officeDocument/2006/relationships" xmlns:p="http://schemas.openxmlformats.org/presentationml/2006/main">
   <p:cSld>
     <p:spTree>
@@ -9771,7 +10435,7 @@
 </p:sld>
 </file>
 
-<file path=ppt/slides/slide16.xml><?xml version="1.0" encoding="utf-8"?>
+<file path=ppt/slides/slide17.xml><?xml version="1.0" encoding="utf-8"?>
 <p:sld xmlns:a="http://schemas.openxmlformats.org/drawingml/2006/main" xmlns:r="http://schemas.openxmlformats.org/officeDocument/2006/relationships" xmlns:p="http://schemas.openxmlformats.org/presentationml/2006/main">
   <p:cSld>
     <p:spTree>
@@ -10778,7 +11442,7 @@
 </p:sld>
 </file>
 
-<file path=ppt/slides/slide17.xml><?xml version="1.0" encoding="utf-8"?>
+<file path=ppt/slides/slide18.xml><?xml version="1.0" encoding="utf-8"?>
 <p:sld xmlns:a="http://schemas.openxmlformats.org/drawingml/2006/main" xmlns:r="http://schemas.openxmlformats.org/officeDocument/2006/relationships" xmlns:p="http://schemas.openxmlformats.org/presentationml/2006/main">
   <p:cSld>
     <p:spTree>
@@ -11290,7 +11954,7 @@
 </p:sld>
 </file>
 
-<file path=ppt/slides/slide18.xml><?xml version="1.0" encoding="utf-8"?>
+<file path=ppt/slides/slide19.xml><?xml version="1.0" encoding="utf-8"?>
 <p:sld xmlns:a="http://schemas.openxmlformats.org/drawingml/2006/main" xmlns:r="http://schemas.openxmlformats.org/officeDocument/2006/relationships" xmlns:p="http://schemas.openxmlformats.org/presentationml/2006/main">
   <p:cSld>
     <p:spTree>
@@ -11770,7 +12434,327 @@
 </p:sld>
 </file>
 
-<file path=ppt/slides/slide19.xml><?xml version="1.0" encoding="utf-8"?>
+<file path=ppt/slides/slide2.xml><?xml version="1.0" encoding="utf-8"?>
+<p:sld xmlns:a="http://schemas.openxmlformats.org/drawingml/2006/main" xmlns:r="http://schemas.openxmlformats.org/officeDocument/2006/relationships" xmlns:p="http://schemas.openxmlformats.org/presentationml/2006/main">
+  <p:cSld>
+    <p:spTree>
+      <p:nvGrpSpPr>
+        <p:cNvPr id="1" name=""/>
+        <p:cNvGrpSpPr/>
+        <p:nvPr/>
+      </p:nvGrpSpPr>
+      <p:grpSpPr>
+        <a:xfrm>
+          <a:off x="0" y="0"/>
+          <a:ext cx="0" cy="0"/>
+          <a:chOff x="0" y="0"/>
+          <a:chExt cx="0" cy="0"/>
+        </a:xfrm>
+      </p:grpSpPr>
+      <p:sp>
+        <p:nvSpPr>
+          <p:cNvPr id="2" name="Title 1">
+            <a:extLst>
+              <a:ext uri="{FF2B5EF4-FFF2-40B4-BE49-F238E27FC236}">
+                <a16:creationId xmlns:a16="http://schemas.microsoft.com/office/drawing/2014/main" id="{5A1937CF-7054-4DA5-B322-3ABA2E86C873}"/>
+              </a:ext>
+            </a:extLst>
+          </p:cNvPr>
+          <p:cNvSpPr>
+            <a:spLocks noGrp="1"/>
+          </p:cNvSpPr>
+          <p:nvPr>
+            <p:ph type="title"/>
+          </p:nvPr>
+        </p:nvSpPr>
+        <p:spPr/>
+        <p:txBody>
+          <a:bodyPr/>
+          <a:lstStyle/>
+          <a:p>
+            <a:r>
+              <a:rPr lang="en-US" dirty="0">
+                <a:latin typeface="Times New Roman" panose="02020603050405020304" pitchFamily="18" charset="0"/>
+                <a:cs typeface="Times New Roman" panose="02020603050405020304" pitchFamily="18" charset="0"/>
+              </a:rPr>
+              <a:t>Content</a:t>
+            </a:r>
+          </a:p>
+        </p:txBody>
+      </p:sp>
+      <mc:AlternateContent xmlns:mc="http://schemas.openxmlformats.org/markup-compatibility/2006">
+        <mc:Choice xmlns:a14="http://schemas.microsoft.com/office/drawing/2010/main" Requires="a14">
+          <p:sp>
+            <p:nvSpPr>
+              <p:cNvPr id="3" name="Content Placeholder 2">
+                <a:extLst>
+                  <a:ext uri="{FF2B5EF4-FFF2-40B4-BE49-F238E27FC236}">
+                    <a16:creationId xmlns:a16="http://schemas.microsoft.com/office/drawing/2014/main" id="{A3DF622F-1D66-4E82-869D-053927A68F47}"/>
+                  </a:ext>
+                </a:extLst>
+              </p:cNvPr>
+              <p:cNvSpPr>
+                <a:spLocks noGrp="1"/>
+              </p:cNvSpPr>
+              <p:nvPr>
+                <p:ph idx="1"/>
+              </p:nvPr>
+            </p:nvSpPr>
+            <p:spPr/>
+            <p:txBody>
+              <a:bodyPr>
+                <a:normAutofit/>
+              </a:bodyPr>
+              <a:lstStyle/>
+              <a:p>
+                <a:pPr marL="514350" lvl="0" indent="-514350">
+                  <a:buFont typeface="+mj-lt"/>
+                  <a:buAutoNum type="arabicPeriod"/>
+                </a:pPr>
+                <a:r>
+                  <a:rPr lang="en-US" sz="1800" dirty="0">
+                    <a:latin typeface="Times New Roman" panose="02020603050405020304" pitchFamily="18" charset="0"/>
+                    <a:cs typeface="Times New Roman" panose="02020603050405020304" pitchFamily="18" charset="0"/>
+                  </a:rPr>
+                  <a:t>Experiment on a different combination of feature sets </a:t>
+                </a:r>
+              </a:p>
+              <a:p>
+                <a:pPr lvl="1">
+                  <a:buFont typeface="Wingdings" panose="05000000000000000000" pitchFamily="2" charset="2"/>
+                  <a:buChar char="ü"/>
+                </a:pPr>
+                <a:r>
+                  <a:rPr lang="en-US" sz="1600" dirty="0">
+                    <a:latin typeface="Times New Roman" panose="02020603050405020304" pitchFamily="18" charset="0"/>
+                    <a:cs typeface="Times New Roman" panose="02020603050405020304" pitchFamily="18" charset="0"/>
+                  </a:rPr>
+                  <a:t>From the selected 12 features, the experiment tries to find best </a:t>
+                </a:r>
+                <a14:m>
+                  <m:oMath xmlns:m="http://schemas.openxmlformats.org/officeDocument/2006/math">
+                    <m:r>
+                      <a:rPr lang="en-US" sz="1600" i="1">
+                        <a:latin typeface="Cambria Math" panose="02040503050406030204" pitchFamily="18" charset="0"/>
+                      </a:rPr>
+                      <m:t>𝑛</m:t>
+                    </m:r>
+                    <m:r>
+                      <a:rPr lang="en-US" sz="1600" i="1">
+                        <a:latin typeface="Cambria Math" panose="02040503050406030204" pitchFamily="18" charset="0"/>
+                      </a:rPr>
+                      <m:t>, [</m:t>
+                    </m:r>
+                    <m:r>
+                      <a:rPr lang="en-US" sz="1600" i="1">
+                        <a:latin typeface="Cambria Math" panose="02040503050406030204" pitchFamily="18" charset="0"/>
+                      </a:rPr>
+                      <m:t>𝑛</m:t>
+                    </m:r>
+                    <m:r>
+                      <a:rPr lang="en-US" sz="1600" i="1">
+                        <a:latin typeface="Cambria Math" panose="02040503050406030204" pitchFamily="18" charset="0"/>
+                      </a:rPr>
+                      <m:t>=5,6,7,8,9,10]</m:t>
+                    </m:r>
+                  </m:oMath>
+                </a14:m>
+                <a:r>
+                  <a:rPr lang="en-US" sz="1600" dirty="0">
+                    <a:latin typeface="Times New Roman" panose="02020603050405020304" pitchFamily="18" charset="0"/>
+                    <a:cs typeface="Times New Roman" panose="02020603050405020304" pitchFamily="18" charset="0"/>
+                  </a:rPr>
+                  <a:t> features combination which can result in a better result </a:t>
+                </a:r>
+              </a:p>
+              <a:p>
+                <a:pPr marL="457200" indent="-457200">
+                  <a:buFont typeface="+mj-lt"/>
+                  <a:buAutoNum type="arabicPeriod"/>
+                </a:pPr>
+                <a:r>
+                  <a:rPr lang="en-US" sz="1800" dirty="0">
+                    <a:latin typeface="Times New Roman" panose="02020603050405020304" pitchFamily="18" charset="0"/>
+                    <a:cs typeface="Times New Roman" panose="02020603050405020304" pitchFamily="18" charset="0"/>
+                  </a:rPr>
+                  <a:t>Ensemble models: </a:t>
+                </a:r>
+              </a:p>
+              <a:p>
+                <a:pPr lvl="1">
+                  <a:buFont typeface="Wingdings" panose="05000000000000000000" pitchFamily="2" charset="2"/>
+                  <a:buChar char="ü"/>
+                </a:pPr>
+                <a:r>
+                  <a:rPr lang="en-US" sz="1600" dirty="0">
+                    <a:latin typeface="Times New Roman" panose="02020603050405020304" pitchFamily="18" charset="0"/>
+                    <a:cs typeface="Times New Roman" panose="02020603050405020304" pitchFamily="18" charset="0"/>
+                  </a:rPr>
+                  <a:t>These methods combine top 5 accurate models from each feature set and evaluates the performance per feature set </a:t>
+                </a:r>
+                <a14:m>
+                  <m:oMath xmlns:m="http://schemas.openxmlformats.org/officeDocument/2006/math">
+                    <m:r>
+                      <a:rPr lang="en-US" sz="1600" b="0" i="0" smtClean="0">
+                        <a:latin typeface="Cambria Math" panose="02040503050406030204" pitchFamily="18" charset="0"/>
+                      </a:rPr>
+                      <m:t>(</m:t>
+                    </m:r>
+                    <m:r>
+                      <a:rPr lang="en-US" sz="1600" i="1">
+                        <a:latin typeface="Cambria Math" panose="02040503050406030204" pitchFamily="18" charset="0"/>
+                      </a:rPr>
+                      <m:t>𝑛</m:t>
+                    </m:r>
+                    <m:r>
+                      <a:rPr lang="en-US" sz="1600" b="0" i="1" smtClean="0">
+                        <a:latin typeface="Cambria Math" panose="02040503050406030204" pitchFamily="18" charset="0"/>
+                      </a:rPr>
+                      <m:t>)</m:t>
+                    </m:r>
+                  </m:oMath>
+                </a14:m>
+                <a:endParaRPr lang="en-US" sz="1600" dirty="0">
+                  <a:latin typeface="Times New Roman" panose="02020603050405020304" pitchFamily="18" charset="0"/>
+                  <a:cs typeface="Times New Roman" panose="02020603050405020304" pitchFamily="18" charset="0"/>
+                </a:endParaRPr>
+              </a:p>
+              <a:p>
+                <a:pPr marL="457200" indent="-457200">
+                  <a:buFont typeface="+mj-lt"/>
+                  <a:buAutoNum type="arabicPeriod"/>
+                </a:pPr>
+                <a:r>
+                  <a:rPr lang="en-US" sz="1800" dirty="0">
+                    <a:latin typeface="Times New Roman" panose="02020603050405020304" pitchFamily="18" charset="0"/>
+                    <a:cs typeface="Times New Roman" panose="02020603050405020304" pitchFamily="18" charset="0"/>
+                  </a:rPr>
+                  <a:t>Experiment on Ensemble models of the models used in section 3</a:t>
+                </a:r>
+              </a:p>
+              <a:p>
+                <a:pPr marL="457200" indent="-457200">
+                  <a:buFont typeface="+mj-lt"/>
+                  <a:buAutoNum type="arabicPeriod"/>
+                </a:pPr>
+                <a:r>
+                  <a:rPr lang="en-US" sz="1800" dirty="0">
+                    <a:latin typeface="Times New Roman" panose="02020603050405020304" pitchFamily="18" charset="0"/>
+                    <a:cs typeface="Times New Roman" panose="02020603050405020304" pitchFamily="18" charset="0"/>
+                  </a:rPr>
+                  <a:t>Experiment on consecutive two years of data for predicting the third year’s outcome</a:t>
+                </a:r>
+              </a:p>
+              <a:p>
+                <a:pPr lvl="1">
+                  <a:buFont typeface="Wingdings" panose="05000000000000000000" pitchFamily="2" charset="2"/>
+                  <a:buChar char="ü"/>
+                </a:pPr>
+                <a:r>
+                  <a:rPr lang="en-US" sz="1600" dirty="0">
+                    <a:latin typeface="Times New Roman" panose="02020603050405020304" pitchFamily="18" charset="0"/>
+                    <a:cs typeface="Times New Roman" panose="02020603050405020304" pitchFamily="18" charset="0"/>
+                  </a:rPr>
+                  <a:t>The data used in the experiment are two years consecutive information to predict the third year status. In addition Comparison of the 5 traditional features and 12 features using the proposed procedure and clustering approach is presented</a:t>
+                </a:r>
+                <a:endParaRPr lang="en-US" sz="1400" dirty="0">
+                  <a:latin typeface="Times New Roman" panose="02020603050405020304" pitchFamily="18" charset="0"/>
+                  <a:cs typeface="Times New Roman" panose="02020603050405020304" pitchFamily="18" charset="0"/>
+                </a:endParaRPr>
+              </a:p>
+              <a:p>
+                <a:pPr marL="457200" indent="-457200">
+                  <a:buFont typeface="+mj-lt"/>
+                  <a:buAutoNum type="arabicPeriod"/>
+                </a:pPr>
+                <a:r>
+                  <a:rPr lang="en-US" sz="1800" dirty="0">
+                    <a:latin typeface="Times New Roman" panose="02020603050405020304" pitchFamily="18" charset="0"/>
+                    <a:cs typeface="Times New Roman" panose="02020603050405020304" pitchFamily="18" charset="0"/>
+                  </a:rPr>
+                  <a:t>Experiment on patients who are diagnosed with high blood pressure (HBP)</a:t>
+                </a:r>
+              </a:p>
+              <a:p>
+                <a:pPr marL="457200" indent="-457200">
+                  <a:buFont typeface="+mj-lt"/>
+                  <a:buAutoNum type="arabicPeriod"/>
+                </a:pPr>
+                <a:r>
+                  <a:rPr lang="en-US" sz="1800" dirty="0">
+                    <a:latin typeface="Times New Roman" panose="02020603050405020304" pitchFamily="18" charset="0"/>
+                    <a:cs typeface="Times New Roman" panose="02020603050405020304" pitchFamily="18" charset="0"/>
+                  </a:rPr>
+                  <a:t>Experiment on dataset with HBP history included as feature </a:t>
+                </a:r>
+              </a:p>
+              <a:p>
+                <a:pPr marL="514350" lvl="0" indent="-514350">
+                  <a:buFont typeface="+mj-lt"/>
+                  <a:buAutoNum type="arabicPeriod"/>
+                </a:pPr>
+                <a:endParaRPr lang="en-US" sz="1800" dirty="0">
+                  <a:latin typeface="Times New Roman" panose="02020603050405020304" pitchFamily="18" charset="0"/>
+                  <a:cs typeface="Times New Roman" panose="02020603050405020304" pitchFamily="18" charset="0"/>
+                </a:endParaRPr>
+              </a:p>
+            </p:txBody>
+          </p:sp>
+        </mc:Choice>
+        <mc:Fallback>
+          <p:sp>
+            <p:nvSpPr>
+              <p:cNvPr id="3" name="Content Placeholder 2">
+                <a:extLst>
+                  <a:ext uri="{FF2B5EF4-FFF2-40B4-BE49-F238E27FC236}">
+                    <a16:creationId xmlns:a16="http://schemas.microsoft.com/office/drawing/2014/main" id="{A3DF622F-1D66-4E82-869D-053927A68F47}"/>
+                  </a:ext>
+                </a:extLst>
+              </p:cNvPr>
+              <p:cNvSpPr>
+                <a:spLocks noGrp="1" noRot="1" noChangeAspect="1" noMove="1" noResize="1" noEditPoints="1" noAdjustHandles="1" noChangeArrowheads="1" noChangeShapeType="1" noTextEdit="1"/>
+              </p:cNvSpPr>
+              <p:nvPr>
+                <p:ph idx="1"/>
+              </p:nvPr>
+            </p:nvSpPr>
+            <p:spPr>
+              <a:blipFill>
+                <a:blip r:embed="rId2"/>
+                <a:stretch>
+                  <a:fillRect l="-406" t="-1261"/>
+                </a:stretch>
+              </a:blipFill>
+            </p:spPr>
+            <p:txBody>
+              <a:bodyPr/>
+              <a:lstStyle/>
+              <a:p>
+                <a:r>
+                  <a:rPr lang="en-US">
+                    <a:noFill/>
+                  </a:rPr>
+                  <a:t> </a:t>
+                </a:r>
+              </a:p>
+            </p:txBody>
+          </p:sp>
+        </mc:Fallback>
+      </mc:AlternateContent>
+    </p:spTree>
+    <p:extLst>
+      <p:ext uri="{BB962C8B-B14F-4D97-AF65-F5344CB8AC3E}">
+        <p14:creationId xmlns:p14="http://schemas.microsoft.com/office/powerpoint/2010/main" val="1948006434"/>
+      </p:ext>
+    </p:extLst>
+  </p:cSld>
+  <p:clrMapOvr>
+    <a:masterClrMapping/>
+  </p:clrMapOvr>
+</p:sld>
+</file>
+
+<file path=ppt/slides/slide20.xml><?xml version="1.0" encoding="utf-8"?>
 <p:sld xmlns:a="http://schemas.openxmlformats.org/drawingml/2006/main" xmlns:r="http://schemas.openxmlformats.org/officeDocument/2006/relationships" xmlns:p="http://schemas.openxmlformats.org/presentationml/2006/main">
   <p:cSld>
     <p:spTree>
@@ -12306,235 +13290,7 @@
 </p:sld>
 </file>
 
-<file path=ppt/slides/slide2.xml><?xml version="1.0" encoding="utf-8"?>
-<p:sld xmlns:a="http://schemas.openxmlformats.org/drawingml/2006/main" xmlns:r="http://schemas.openxmlformats.org/officeDocument/2006/relationships" xmlns:p="http://schemas.openxmlformats.org/presentationml/2006/main">
-  <p:cSld>
-    <p:spTree>
-      <p:nvGrpSpPr>
-        <p:cNvPr id="1" name=""/>
-        <p:cNvGrpSpPr/>
-        <p:nvPr/>
-      </p:nvGrpSpPr>
-      <p:grpSpPr>
-        <a:xfrm>
-          <a:off x="0" y="0"/>
-          <a:ext cx="0" cy="0"/>
-          <a:chOff x="0" y="0"/>
-          <a:chExt cx="0" cy="0"/>
-        </a:xfrm>
-      </p:grpSpPr>
-      <p:sp>
-        <p:nvSpPr>
-          <p:cNvPr id="2" name="Title 1">
-            <a:extLst>
-              <a:ext uri="{FF2B5EF4-FFF2-40B4-BE49-F238E27FC236}">
-                <a16:creationId xmlns:a16="http://schemas.microsoft.com/office/drawing/2014/main" id="{5A1937CF-7054-4DA5-B322-3ABA2E86C873}"/>
-              </a:ext>
-            </a:extLst>
-          </p:cNvPr>
-          <p:cNvSpPr>
-            <a:spLocks noGrp="1"/>
-          </p:cNvSpPr>
-          <p:nvPr>
-            <p:ph type="title"/>
-          </p:nvPr>
-        </p:nvSpPr>
-        <p:spPr/>
-        <p:txBody>
-          <a:bodyPr/>
-          <a:lstStyle/>
-          <a:p>
-            <a:r>
-              <a:rPr lang="en-US" dirty="0"/>
-              <a:t>Content</a:t>
-            </a:r>
-          </a:p>
-        </p:txBody>
-      </p:sp>
-      <mc:AlternateContent xmlns:mc="http://schemas.openxmlformats.org/markup-compatibility/2006" xmlns:a14="http://schemas.microsoft.com/office/drawing/2010/main">
-        <mc:Choice Requires="a14">
-          <p:sp>
-            <p:nvSpPr>
-              <p:cNvPr id="3" name="Content Placeholder 2">
-                <a:extLst>
-                  <a:ext uri="{FF2B5EF4-FFF2-40B4-BE49-F238E27FC236}">
-                    <a16:creationId xmlns:a16="http://schemas.microsoft.com/office/drawing/2014/main" id="{A3DF622F-1D66-4E82-869D-053927A68F47}"/>
-                  </a:ext>
-                </a:extLst>
-              </p:cNvPr>
-              <p:cNvSpPr>
-                <a:spLocks noGrp="1"/>
-              </p:cNvSpPr>
-              <p:nvPr>
-                <p:ph idx="1"/>
-              </p:nvPr>
-            </p:nvSpPr>
-            <p:spPr/>
-            <p:txBody>
-              <a:bodyPr>
-                <a:normAutofit/>
-              </a:bodyPr>
-              <a:lstStyle/>
-              <a:p>
-                <a:pPr marL="514350" lvl="0" indent="-514350">
-                  <a:buFont typeface="+mj-lt"/>
-                  <a:buAutoNum type="arabicPeriod"/>
-                </a:pPr>
-                <a:r>
-                  <a:rPr lang="en-US" sz="2000" dirty="0"/>
-                  <a:t>Experiment on a different combination of feature sets </a:t>
-                </a:r>
-              </a:p>
-              <a:p>
-                <a:pPr lvl="1">
-                  <a:buFont typeface="Wingdings" panose="05000000000000000000" pitchFamily="2" charset="2"/>
-                  <a:buChar char="ü"/>
-                </a:pPr>
-                <a:r>
-                  <a:rPr lang="en-US" sz="1800" dirty="0"/>
-                  <a:t>From the selected 12 features, the experiment tries to find best </a:t>
-                </a:r>
-                <a14:m>
-                  <m:oMath xmlns:m="http://schemas.openxmlformats.org/officeDocument/2006/math">
-                    <m:r>
-                      <a:rPr lang="en-US" sz="1800" i="1">
-                        <a:latin typeface="Cambria Math" panose="02040503050406030204" pitchFamily="18" charset="0"/>
-                      </a:rPr>
-                      <m:t>𝑛</m:t>
-                    </m:r>
-                    <m:r>
-                      <a:rPr lang="en-US" sz="1800" i="1">
-                        <a:latin typeface="Cambria Math" panose="02040503050406030204" pitchFamily="18" charset="0"/>
-                      </a:rPr>
-                      <m:t>, [</m:t>
-                    </m:r>
-                    <m:r>
-                      <a:rPr lang="en-US" sz="1800" i="1">
-                        <a:latin typeface="Cambria Math" panose="02040503050406030204" pitchFamily="18" charset="0"/>
-                      </a:rPr>
-                      <m:t>𝑛</m:t>
-                    </m:r>
-                    <m:r>
-                      <a:rPr lang="en-US" sz="1800" i="1">
-                        <a:latin typeface="Cambria Math" panose="02040503050406030204" pitchFamily="18" charset="0"/>
-                      </a:rPr>
-                      <m:t>=5,6,7,8,9,10]</m:t>
-                    </m:r>
-                  </m:oMath>
-                </a14:m>
-                <a:r>
-                  <a:rPr lang="en-US" sz="1800" dirty="0"/>
-                  <a:t> features combination which can result in a better result </a:t>
-                </a:r>
-              </a:p>
-              <a:p>
-                <a:pPr lvl="1">
-                  <a:buFont typeface="Wingdings" panose="05000000000000000000" pitchFamily="2" charset="2"/>
-                  <a:buChar char="ü"/>
-                </a:pPr>
-                <a:r>
-                  <a:rPr lang="en-US" sz="1800" dirty="0"/>
-                  <a:t>Comparison of the 5 traditional features and 12 features using the proposed procedure and clustering approach</a:t>
-                </a:r>
-              </a:p>
-              <a:p>
-                <a:pPr lvl="1">
-                  <a:buFont typeface="Wingdings" panose="05000000000000000000" pitchFamily="2" charset="2"/>
-                  <a:buChar char="ü"/>
-                </a:pPr>
-                <a:r>
-                  <a:rPr lang="en-US" sz="1800" dirty="0"/>
-                  <a:t>Ensemble models: these methods combine top 5 accurate models from each feature set and evaluates the performance per feature set </a:t>
-                </a:r>
-                <a14:m>
-                  <m:oMath xmlns:m="http://schemas.openxmlformats.org/officeDocument/2006/math">
-                    <m:r>
-                      <a:rPr lang="en-US" sz="1800" i="1">
-                        <a:latin typeface="Cambria Math" panose="02040503050406030204" pitchFamily="18" charset="0"/>
-                      </a:rPr>
-                      <m:t>𝑛</m:t>
-                    </m:r>
-                  </m:oMath>
-                </a14:m>
-                <a:endParaRPr lang="en-US" sz="1800" dirty="0"/>
-              </a:p>
-              <a:p>
-                <a:pPr lvl="1">
-                  <a:buFont typeface="Wingdings" panose="05000000000000000000" pitchFamily="2" charset="2"/>
-                  <a:buChar char="ü"/>
-                </a:pPr>
-                <a:r>
-                  <a:rPr lang="en-US" sz="1800" dirty="0"/>
-                  <a:t>Ensemble all models used in section b</a:t>
-                </a:r>
-              </a:p>
-              <a:p>
-                <a:pPr marL="514350" lvl="0" indent="-514350">
-                  <a:buFont typeface="+mj-lt"/>
-                  <a:buAutoNum type="arabicPeriod"/>
-                </a:pPr>
-                <a:r>
-                  <a:rPr lang="en-US" sz="2000" dirty="0"/>
-                  <a:t>Experiment on consecutive two years of data for predicting the third year’s outcome</a:t>
-                </a:r>
-              </a:p>
-            </p:txBody>
-          </p:sp>
-        </mc:Choice>
-        <mc:Fallback xmlns="">
-          <p:sp>
-            <p:nvSpPr>
-              <p:cNvPr id="3" name="Content Placeholder 2">
-                <a:extLst>
-                  <a:ext uri="{FF2B5EF4-FFF2-40B4-BE49-F238E27FC236}">
-                    <a16:creationId xmlns:a16="http://schemas.microsoft.com/office/drawing/2014/main" id="{A3DF622F-1D66-4E82-869D-053927A68F47}"/>
-                  </a:ext>
-                </a:extLst>
-              </p:cNvPr>
-              <p:cNvSpPr>
-                <a:spLocks noGrp="1" noRot="1" noChangeAspect="1" noMove="1" noResize="1" noEditPoints="1" noAdjustHandles="1" noChangeArrowheads="1" noChangeShapeType="1" noTextEdit="1"/>
-              </p:cNvSpPr>
-              <p:nvPr>
-                <p:ph idx="1"/>
-              </p:nvPr>
-            </p:nvSpPr>
-            <p:spPr>
-              <a:blipFill>
-                <a:blip r:embed="rId2"/>
-                <a:stretch>
-                  <a:fillRect l="-638" t="-1541"/>
-                </a:stretch>
-              </a:blipFill>
-            </p:spPr>
-            <p:txBody>
-              <a:bodyPr/>
-              <a:lstStyle/>
-              <a:p>
-                <a:r>
-                  <a:rPr lang="en-US">
-                    <a:noFill/>
-                  </a:rPr>
-                  <a:t> </a:t>
-                </a:r>
-              </a:p>
-            </p:txBody>
-          </p:sp>
-        </mc:Fallback>
-      </mc:AlternateContent>
-    </p:spTree>
-    <p:extLst>
-      <p:ext uri="{BB962C8B-B14F-4D97-AF65-F5344CB8AC3E}">
-        <p14:creationId xmlns:p14="http://schemas.microsoft.com/office/powerpoint/2010/main" val="2413830443"/>
-      </p:ext>
-    </p:extLst>
-  </p:cSld>
-  <p:clrMapOvr>
-    <a:masterClrMapping/>
-  </p:clrMapOvr>
-</p:sld>
-</file>
-
-<file path=ppt/slides/slide20.xml><?xml version="1.0" encoding="utf-8"?>
+<file path=ppt/slides/slide21.xml><?xml version="1.0" encoding="utf-8"?>
 <p:sld xmlns:a="http://schemas.openxmlformats.org/drawingml/2006/main" xmlns:r="http://schemas.openxmlformats.org/officeDocument/2006/relationships" xmlns:p="http://schemas.openxmlformats.org/presentationml/2006/main">
   <p:cSld>
     <p:spTree>
@@ -12976,7 +13732,7 @@
               <a:noFill/>
               <a:extLst>
                 <a:ext uri="{909E8E84-426E-40dd-AFC4-6F175D3DCCD1}">
-                  <a14:hiddenFill xmlns:a14="http://schemas.microsoft.com/office/drawing/2010/main" xmlns="">
+                  <a14:hiddenFill xmlns="" xmlns:a14="http://schemas.microsoft.com/office/drawing/2010/main">
                     <a:solidFill>
                       <a:srgbClr val="FFFFFF"/>
                     </a:solidFill>
@@ -13191,7 +13947,7 @@
 </p:sld>
 </file>
 
-<file path=ppt/slides/slide21.xml><?xml version="1.0" encoding="utf-8"?>
+<file path=ppt/slides/slide22.xml><?xml version="1.0" encoding="utf-8"?>
 <p:sld xmlns:a="http://schemas.openxmlformats.org/drawingml/2006/main" xmlns:r="http://schemas.openxmlformats.org/officeDocument/2006/relationships" xmlns:p="http://schemas.openxmlformats.org/presentationml/2006/main">
   <p:cSld>
     <p:spTree>
@@ -13680,7 +14436,7 @@
 </p:sld>
 </file>
 
-<file path=ppt/slides/slide22.xml><?xml version="1.0" encoding="utf-8"?>
+<file path=ppt/slides/slide23.xml><?xml version="1.0" encoding="utf-8"?>
 <p:sld xmlns:a="http://schemas.openxmlformats.org/drawingml/2006/main" xmlns:r="http://schemas.openxmlformats.org/officeDocument/2006/relationships" xmlns:p="http://schemas.openxmlformats.org/presentationml/2006/main">
   <p:cSld>
     <p:spTree>
@@ -14187,7 +14943,7 @@
 </p:sld>
 </file>
 
-<file path=ppt/slides/slide23.xml><?xml version="1.0" encoding="utf-8"?>
+<file path=ppt/slides/slide24.xml><?xml version="1.0" encoding="utf-8"?>
 <p:sld xmlns:a="http://schemas.openxmlformats.org/drawingml/2006/main" xmlns:r="http://schemas.openxmlformats.org/officeDocument/2006/relationships" xmlns:p="http://schemas.openxmlformats.org/presentationml/2006/main">
   <p:cSld>
     <p:spTree>
@@ -14723,7 +15479,7 @@
 </p:sld>
 </file>
 
-<file path=ppt/slides/slide24.xml><?xml version="1.0" encoding="utf-8"?>
+<file path=ppt/slides/slide25.xml><?xml version="1.0" encoding="utf-8"?>
 <p:sld xmlns:a="http://schemas.openxmlformats.org/drawingml/2006/main" xmlns:r="http://schemas.openxmlformats.org/officeDocument/2006/relationships" xmlns:p="http://schemas.openxmlformats.org/presentationml/2006/main">
   <p:cSld>
     <p:spTree>
@@ -15252,6 +16008,234 @@
           <p:cNvPr id="2" name="Title 1">
             <a:extLst>
               <a:ext uri="{FF2B5EF4-FFF2-40B4-BE49-F238E27FC236}">
+                <a16:creationId xmlns:a16="http://schemas.microsoft.com/office/drawing/2014/main" id="{5A1937CF-7054-4DA5-B322-3ABA2E86C873}"/>
+              </a:ext>
+            </a:extLst>
+          </p:cNvPr>
+          <p:cNvSpPr>
+            <a:spLocks noGrp="1"/>
+          </p:cNvSpPr>
+          <p:nvPr>
+            <p:ph type="title"/>
+          </p:nvPr>
+        </p:nvSpPr>
+        <p:spPr/>
+        <p:txBody>
+          <a:bodyPr/>
+          <a:lstStyle/>
+          <a:p>
+            <a:r>
+              <a:rPr lang="en-US" dirty="0"/>
+              <a:t>Content</a:t>
+            </a:r>
+          </a:p>
+        </p:txBody>
+      </p:sp>
+      <mc:AlternateContent xmlns:mc="http://schemas.openxmlformats.org/markup-compatibility/2006" xmlns:a14="http://schemas.microsoft.com/office/drawing/2010/main">
+        <mc:Choice Requires="a14">
+          <p:sp>
+            <p:nvSpPr>
+              <p:cNvPr id="3" name="Content Placeholder 2">
+                <a:extLst>
+                  <a:ext uri="{FF2B5EF4-FFF2-40B4-BE49-F238E27FC236}">
+                    <a16:creationId xmlns:a16="http://schemas.microsoft.com/office/drawing/2014/main" id="{A3DF622F-1D66-4E82-869D-053927A68F47}"/>
+                  </a:ext>
+                </a:extLst>
+              </p:cNvPr>
+              <p:cNvSpPr>
+                <a:spLocks noGrp="1"/>
+              </p:cNvSpPr>
+              <p:nvPr>
+                <p:ph idx="1"/>
+              </p:nvPr>
+            </p:nvSpPr>
+            <p:spPr/>
+            <p:txBody>
+              <a:bodyPr>
+                <a:normAutofit/>
+              </a:bodyPr>
+              <a:lstStyle/>
+              <a:p>
+                <a:pPr marL="514350" lvl="0" indent="-514350">
+                  <a:buFont typeface="+mj-lt"/>
+                  <a:buAutoNum type="arabicPeriod"/>
+                </a:pPr>
+                <a:r>
+                  <a:rPr lang="en-US" sz="2000" dirty="0"/>
+                  <a:t>Experiment on a different combination of feature sets </a:t>
+                </a:r>
+              </a:p>
+              <a:p>
+                <a:pPr lvl="1">
+                  <a:buFont typeface="Wingdings" panose="05000000000000000000" pitchFamily="2" charset="2"/>
+                  <a:buChar char="ü"/>
+                </a:pPr>
+                <a:r>
+                  <a:rPr lang="en-US" sz="1800" dirty="0"/>
+                  <a:t>From the selected 12 features, the experiment tries to find best </a:t>
+                </a:r>
+                <a14:m>
+                  <m:oMath xmlns:m="http://schemas.openxmlformats.org/officeDocument/2006/math">
+                    <m:r>
+                      <a:rPr lang="en-US" sz="1800" i="1">
+                        <a:latin typeface="Cambria Math" panose="02040503050406030204" pitchFamily="18" charset="0"/>
+                      </a:rPr>
+                      <m:t>𝑛</m:t>
+                    </m:r>
+                    <m:r>
+                      <a:rPr lang="en-US" sz="1800" i="1">
+                        <a:latin typeface="Cambria Math" panose="02040503050406030204" pitchFamily="18" charset="0"/>
+                      </a:rPr>
+                      <m:t>, [</m:t>
+                    </m:r>
+                    <m:r>
+                      <a:rPr lang="en-US" sz="1800" i="1">
+                        <a:latin typeface="Cambria Math" panose="02040503050406030204" pitchFamily="18" charset="0"/>
+                      </a:rPr>
+                      <m:t>𝑛</m:t>
+                    </m:r>
+                    <m:r>
+                      <a:rPr lang="en-US" sz="1800" i="1">
+                        <a:latin typeface="Cambria Math" panose="02040503050406030204" pitchFamily="18" charset="0"/>
+                      </a:rPr>
+                      <m:t>=5,6,7,8,9,10]</m:t>
+                    </m:r>
+                  </m:oMath>
+                </a14:m>
+                <a:r>
+                  <a:rPr lang="en-US" sz="1800" dirty="0"/>
+                  <a:t> features combination which can result in a better result </a:t>
+                </a:r>
+              </a:p>
+              <a:p>
+                <a:pPr lvl="1">
+                  <a:buFont typeface="Wingdings" panose="05000000000000000000" pitchFamily="2" charset="2"/>
+                  <a:buChar char="ü"/>
+                </a:pPr>
+                <a:r>
+                  <a:rPr lang="en-US" sz="1800" dirty="0"/>
+                  <a:t>Comparison of the 5 traditional features and 12 features using the proposed procedure and clustering approach</a:t>
+                </a:r>
+              </a:p>
+              <a:p>
+                <a:pPr lvl="1">
+                  <a:buFont typeface="Wingdings" panose="05000000000000000000" pitchFamily="2" charset="2"/>
+                  <a:buChar char="ü"/>
+                </a:pPr>
+                <a:r>
+                  <a:rPr lang="en-US" sz="1800" dirty="0"/>
+                  <a:t>Ensemble models: these methods combine top 5 accurate models from each feature set and evaluates the performance per feature set </a:t>
+                </a:r>
+                <a14:m>
+                  <m:oMath xmlns:m="http://schemas.openxmlformats.org/officeDocument/2006/math">
+                    <m:r>
+                      <a:rPr lang="en-US" sz="1800" i="1">
+                        <a:latin typeface="Cambria Math" panose="02040503050406030204" pitchFamily="18" charset="0"/>
+                      </a:rPr>
+                      <m:t>𝑛</m:t>
+                    </m:r>
+                  </m:oMath>
+                </a14:m>
+                <a:endParaRPr lang="en-US" sz="1800" dirty="0"/>
+              </a:p>
+              <a:p>
+                <a:pPr lvl="1">
+                  <a:buFont typeface="Wingdings" panose="05000000000000000000" pitchFamily="2" charset="2"/>
+                  <a:buChar char="ü"/>
+                </a:pPr>
+                <a:r>
+                  <a:rPr lang="en-US" sz="1800" dirty="0"/>
+                  <a:t>Ensemble all models used in section b</a:t>
+                </a:r>
+              </a:p>
+              <a:p>
+                <a:pPr marL="514350" lvl="0" indent="-514350">
+                  <a:buFont typeface="+mj-lt"/>
+                  <a:buAutoNum type="arabicPeriod"/>
+                </a:pPr>
+                <a:r>
+                  <a:rPr lang="en-US" sz="2000" dirty="0"/>
+                  <a:t>Experiment on consecutive two years of data for predicting the third year’s outcome</a:t>
+                </a:r>
+              </a:p>
+            </p:txBody>
+          </p:sp>
+        </mc:Choice>
+        <mc:Fallback xmlns="">
+          <p:sp>
+            <p:nvSpPr>
+              <p:cNvPr id="3" name="Content Placeholder 2">
+                <a:extLst>
+                  <a:ext uri="{FF2B5EF4-FFF2-40B4-BE49-F238E27FC236}">
+                    <a16:creationId xmlns:a16="http://schemas.microsoft.com/office/drawing/2014/main" id="{A3DF622F-1D66-4E82-869D-053927A68F47}"/>
+                  </a:ext>
+                </a:extLst>
+              </p:cNvPr>
+              <p:cNvSpPr>
+                <a:spLocks noGrp="1" noRot="1" noChangeAspect="1" noMove="1" noResize="1" noEditPoints="1" noAdjustHandles="1" noChangeArrowheads="1" noChangeShapeType="1" noTextEdit="1"/>
+              </p:cNvSpPr>
+              <p:nvPr>
+                <p:ph idx="1"/>
+              </p:nvPr>
+            </p:nvSpPr>
+            <p:spPr>
+              <a:blipFill>
+                <a:blip r:embed="rId2"/>
+                <a:stretch>
+                  <a:fillRect l="-638" t="-1541"/>
+                </a:stretch>
+              </a:blipFill>
+            </p:spPr>
+            <p:txBody>
+              <a:bodyPr/>
+              <a:lstStyle/>
+              <a:p>
+                <a:r>
+                  <a:rPr lang="en-US">
+                    <a:noFill/>
+                  </a:rPr>
+                  <a:t> </a:t>
+                </a:r>
+              </a:p>
+            </p:txBody>
+          </p:sp>
+        </mc:Fallback>
+      </mc:AlternateContent>
+    </p:spTree>
+    <p:extLst>
+      <p:ext uri="{BB962C8B-B14F-4D97-AF65-F5344CB8AC3E}">
+        <p14:creationId xmlns:p14="http://schemas.microsoft.com/office/powerpoint/2010/main" val="2413830443"/>
+      </p:ext>
+    </p:extLst>
+  </p:cSld>
+  <p:clrMapOvr>
+    <a:masterClrMapping/>
+  </p:clrMapOvr>
+</p:sld>
+</file>
+
+<file path=ppt/slides/slide4.xml><?xml version="1.0" encoding="utf-8"?>
+<p:sld xmlns:a="http://schemas.openxmlformats.org/drawingml/2006/main" xmlns:r="http://schemas.openxmlformats.org/officeDocument/2006/relationships" xmlns:p="http://schemas.openxmlformats.org/presentationml/2006/main">
+  <p:cSld>
+    <p:spTree>
+      <p:nvGrpSpPr>
+        <p:cNvPr id="1" name=""/>
+        <p:cNvGrpSpPr/>
+        <p:nvPr/>
+      </p:nvGrpSpPr>
+      <p:grpSpPr>
+        <a:xfrm>
+          <a:off x="0" y="0"/>
+          <a:ext cx="0" cy="0"/>
+          <a:chOff x="0" y="0"/>
+          <a:chExt cx="0" cy="0"/>
+        </a:xfrm>
+      </p:grpSpPr>
+      <p:sp>
+        <p:nvSpPr>
+          <p:cNvPr id="2" name="Title 1">
+            <a:extLst>
+              <a:ext uri="{FF2B5EF4-FFF2-40B4-BE49-F238E27FC236}">
                 <a16:creationId xmlns:a16="http://schemas.microsoft.com/office/drawing/2014/main" id="{8AC4E1EC-66BC-467E-BB1F-9977A50103A1}"/>
               </a:ext>
             </a:extLst>
@@ -15437,7 +16421,7 @@
               <a:noFill/>
               <a:extLst>
                 <a:ext uri="{909E8E84-426E-40dd-AFC4-6F175D3DCCD1}">
-                  <a14:hiddenFill xmlns="" xmlns:a14="http://schemas.microsoft.com/office/drawing/2010/main">
+                  <a14:hiddenFill xmlns:a14="http://schemas.microsoft.com/office/drawing/2010/main" xmlns="">
                     <a:solidFill>
                       <a:srgbClr val="FFFFFF"/>
                     </a:solidFill>
@@ -15905,7 +16889,7 @@
 </p:sld>
 </file>
 
-<file path=ppt/slides/slide4.xml><?xml version="1.0" encoding="utf-8"?>
+<file path=ppt/slides/slide5.xml><?xml version="1.0" encoding="utf-8"?>
 <p:sld xmlns:a="http://schemas.openxmlformats.org/drawingml/2006/main" xmlns:r="http://schemas.openxmlformats.org/officeDocument/2006/relationships" xmlns:p="http://schemas.openxmlformats.org/presentationml/2006/main">
   <p:cSld>
     <p:spTree>
@@ -16157,7 +17141,7 @@
 </p:sld>
 </file>
 
-<file path=ppt/slides/slide5.xml><?xml version="1.0" encoding="utf-8"?>
+<file path=ppt/slides/slide6.xml><?xml version="1.0" encoding="utf-8"?>
 <p:sld xmlns:a="http://schemas.openxmlformats.org/drawingml/2006/main" xmlns:r="http://schemas.openxmlformats.org/officeDocument/2006/relationships" xmlns:p="http://schemas.openxmlformats.org/presentationml/2006/main">
   <p:cSld>
     <p:spTree>
@@ -17027,7 +18011,7 @@
 </p:sld>
 </file>
 
-<file path=ppt/slides/slide6.xml><?xml version="1.0" encoding="utf-8"?>
+<file path=ppt/slides/slide7.xml><?xml version="1.0" encoding="utf-8"?>
 <p:sld xmlns:a="http://schemas.openxmlformats.org/drawingml/2006/main" xmlns:r="http://schemas.openxmlformats.org/officeDocument/2006/relationships" xmlns:p="http://schemas.openxmlformats.org/presentationml/2006/main">
   <p:cSld>
     <p:spTree>
@@ -17528,7 +18512,7 @@
 </p:sld>
 </file>
 
-<file path=ppt/slides/slide7.xml><?xml version="1.0" encoding="utf-8"?>
+<file path=ppt/slides/slide8.xml><?xml version="1.0" encoding="utf-8"?>
 <p:sld xmlns:a="http://schemas.openxmlformats.org/drawingml/2006/main" xmlns:r="http://schemas.openxmlformats.org/officeDocument/2006/relationships" xmlns:p="http://schemas.openxmlformats.org/presentationml/2006/main">
   <p:cSld>
     <p:spTree>
@@ -18412,7 +19396,7 @@
 </p:sld>
 </file>
 
-<file path=ppt/slides/slide8.xml><?xml version="1.0" encoding="utf-8"?>
+<file path=ppt/slides/slide9.xml><?xml version="1.0" encoding="utf-8"?>
 <p:sld xmlns:a="http://schemas.openxmlformats.org/drawingml/2006/main" xmlns:r="http://schemas.openxmlformats.org/officeDocument/2006/relationships" xmlns:p="http://schemas.openxmlformats.org/presentationml/2006/main">
   <p:cSld>
     <p:spTree>
@@ -18913,669 +19897,6 @@
 </p:sld>
 </file>
 
-<file path=ppt/slides/slide9.xml><?xml version="1.0" encoding="utf-8"?>
-<p:sld xmlns:a="http://schemas.openxmlformats.org/drawingml/2006/main" xmlns:r="http://schemas.openxmlformats.org/officeDocument/2006/relationships" xmlns:p="http://schemas.openxmlformats.org/presentationml/2006/main">
-  <p:cSld>
-    <p:spTree>
-      <p:nvGrpSpPr>
-        <p:cNvPr id="1" name=""/>
-        <p:cNvGrpSpPr/>
-        <p:nvPr/>
-      </p:nvGrpSpPr>
-      <p:grpSpPr>
-        <a:xfrm>
-          <a:off x="0" y="0"/>
-          <a:ext cx="0" cy="0"/>
-          <a:chOff x="0" y="0"/>
-          <a:chExt cx="0" cy="0"/>
-        </a:xfrm>
-      </p:grpSpPr>
-      <p:sp>
-        <p:nvSpPr>
-          <p:cNvPr id="2" name="Title 1">
-            <a:extLst>
-              <a:ext uri="{FF2B5EF4-FFF2-40B4-BE49-F238E27FC236}">
-                <a16:creationId xmlns:a16="http://schemas.microsoft.com/office/drawing/2014/main" id="{FC8DD7DB-3341-4461-8871-D4E9C8AEDD5C}"/>
-              </a:ext>
-            </a:extLst>
-          </p:cNvPr>
-          <p:cNvSpPr>
-            <a:spLocks noGrp="1"/>
-          </p:cNvSpPr>
-          <p:nvPr>
-            <p:ph type="title"/>
-          </p:nvPr>
-        </p:nvSpPr>
-        <p:spPr/>
-        <p:txBody>
-          <a:bodyPr>
-            <a:normAutofit/>
-          </a:bodyPr>
-          <a:lstStyle/>
-          <a:p>
-            <a:r>
-              <a:rPr lang="en-US" sz="3600" dirty="0">
-                <a:latin typeface="Times New Roman" panose="02020603050405020304" pitchFamily="18" charset="0"/>
-                <a:cs typeface="Times New Roman" panose="02020603050405020304" pitchFamily="18" charset="0"/>
-              </a:rPr>
-              <a:t>3. Ensemble Approach</a:t>
-            </a:r>
-          </a:p>
-        </p:txBody>
-      </p:sp>
-      <p:sp>
-        <p:nvSpPr>
-          <p:cNvPr id="3" name="Content Placeholder 2">
-            <a:extLst>
-              <a:ext uri="{FF2B5EF4-FFF2-40B4-BE49-F238E27FC236}">
-                <a16:creationId xmlns:a16="http://schemas.microsoft.com/office/drawing/2014/main" id="{6502C41E-3444-4C0E-AC3D-139CC7E8D8AA}"/>
-              </a:ext>
-            </a:extLst>
-          </p:cNvPr>
-          <p:cNvSpPr>
-            <a:spLocks noGrp="1"/>
-          </p:cNvSpPr>
-          <p:nvPr>
-            <p:ph idx="1"/>
-          </p:nvPr>
-        </p:nvSpPr>
-        <p:spPr>
-          <a:xfrm>
-            <a:off x="838201" y="1825625"/>
-            <a:ext cx="5842518" cy="4351338"/>
-          </a:xfrm>
-        </p:spPr>
-        <p:txBody>
-          <a:bodyPr>
-            <a:normAutofit/>
-          </a:bodyPr>
-          <a:lstStyle/>
-          <a:p>
-            <a:pPr>
-              <a:buFont typeface="Wingdings" panose="05000000000000000000" pitchFamily="2" charset="2"/>
-              <a:buChar char="§"/>
-            </a:pPr>
-            <a:r>
-              <a:rPr lang="en-US" sz="1800" dirty="0">
-                <a:latin typeface="Times New Roman" panose="02020603050405020304" pitchFamily="18" charset="0"/>
-                <a:cs typeface="Times New Roman" panose="02020603050405020304" pitchFamily="18" charset="0"/>
-              </a:rPr>
-              <a:t>In this sub section, top 5 more accurate models from each feature sets are selected and ensembled using </a:t>
-            </a:r>
-          </a:p>
-          <a:p>
-            <a:pPr lvl="1">
-              <a:buFont typeface="Wingdings" panose="05000000000000000000" pitchFamily="2" charset="2"/>
-              <a:buChar char="ü"/>
-            </a:pPr>
-            <a:r>
-              <a:rPr lang="en-US" sz="1600" dirty="0">
-                <a:latin typeface="Times New Roman" panose="02020603050405020304" pitchFamily="18" charset="0"/>
-                <a:cs typeface="Times New Roman" panose="02020603050405020304" pitchFamily="18" charset="0"/>
-              </a:rPr>
-              <a:t>Stacking classifier</a:t>
-            </a:r>
-          </a:p>
-          <a:p>
-            <a:pPr lvl="1">
-              <a:buFont typeface="Wingdings" panose="05000000000000000000" pitchFamily="2" charset="2"/>
-              <a:buChar char="ü"/>
-            </a:pPr>
-            <a:r>
-              <a:rPr lang="en-US" sz="1600" dirty="0">
-                <a:latin typeface="Times New Roman" panose="02020603050405020304" pitchFamily="18" charset="0"/>
-                <a:cs typeface="Times New Roman" panose="02020603050405020304" pitchFamily="18" charset="0"/>
-              </a:rPr>
-              <a:t>Soft voting classifier</a:t>
-            </a:r>
-          </a:p>
-          <a:p>
-            <a:pPr lvl="1">
-              <a:buFont typeface="Wingdings" panose="05000000000000000000" pitchFamily="2" charset="2"/>
-              <a:buChar char="ü"/>
-            </a:pPr>
-            <a:r>
-              <a:rPr lang="en-US" sz="1600" dirty="0">
-                <a:latin typeface="Times New Roman" panose="02020603050405020304" pitchFamily="18" charset="0"/>
-                <a:cs typeface="Times New Roman" panose="02020603050405020304" pitchFamily="18" charset="0"/>
-              </a:rPr>
-              <a:t>Hard voting classifier</a:t>
-            </a:r>
-          </a:p>
-          <a:p>
-            <a:pPr>
-              <a:buFont typeface="Wingdings" panose="05000000000000000000" pitchFamily="2" charset="2"/>
-              <a:buChar char="§"/>
-            </a:pPr>
-            <a:r>
-              <a:rPr lang="en-US" sz="1800" dirty="0">
-                <a:latin typeface="Times New Roman" panose="02020603050405020304" pitchFamily="18" charset="0"/>
-                <a:cs typeface="Times New Roman" panose="02020603050405020304" pitchFamily="18" charset="0"/>
-              </a:rPr>
-              <a:t>The algorithms used in this experiment are</a:t>
-            </a:r>
-          </a:p>
-          <a:p>
-            <a:pPr lvl="1">
-              <a:buFont typeface="Wingdings" panose="05000000000000000000" pitchFamily="2" charset="2"/>
-              <a:buChar char="ü"/>
-            </a:pPr>
-            <a:r>
-              <a:rPr lang="en-US" sz="1600" dirty="0">
-                <a:latin typeface="Times New Roman" panose="02020603050405020304" pitchFamily="18" charset="0"/>
-                <a:cs typeface="Times New Roman" panose="02020603050405020304" pitchFamily="18" charset="0"/>
-              </a:rPr>
-              <a:t>RF</a:t>
-            </a:r>
-          </a:p>
-          <a:p>
-            <a:pPr lvl="1">
-              <a:buFont typeface="Wingdings" panose="05000000000000000000" pitchFamily="2" charset="2"/>
-              <a:buChar char="ü"/>
-            </a:pPr>
-            <a:r>
-              <a:rPr lang="en-US" sz="1600" dirty="0">
-                <a:latin typeface="Times New Roman" panose="02020603050405020304" pitchFamily="18" charset="0"/>
-                <a:cs typeface="Times New Roman" panose="02020603050405020304" pitchFamily="18" charset="0"/>
-              </a:rPr>
-              <a:t>SVM</a:t>
-            </a:r>
-          </a:p>
-          <a:p>
-            <a:pPr lvl="1">
-              <a:buFont typeface="Wingdings" panose="05000000000000000000" pitchFamily="2" charset="2"/>
-              <a:buChar char="ü"/>
-            </a:pPr>
-            <a:r>
-              <a:rPr lang="en-US" sz="1600" dirty="0" err="1">
-                <a:latin typeface="Times New Roman" panose="02020603050405020304" pitchFamily="18" charset="0"/>
-                <a:cs typeface="Times New Roman" panose="02020603050405020304" pitchFamily="18" charset="0"/>
-              </a:rPr>
-              <a:t>XGBoost</a:t>
-            </a:r>
-            <a:endParaRPr lang="en-US" sz="1600" dirty="0">
-              <a:latin typeface="Times New Roman" panose="02020603050405020304" pitchFamily="18" charset="0"/>
-              <a:cs typeface="Times New Roman" panose="02020603050405020304" pitchFamily="18" charset="0"/>
-            </a:endParaRPr>
-          </a:p>
-          <a:p>
-            <a:pPr>
-              <a:buFont typeface="Wingdings" panose="05000000000000000000" pitchFamily="2" charset="2"/>
-              <a:buChar char="§"/>
-            </a:pPr>
-            <a:r>
-              <a:rPr lang="en-US" sz="1800" dirty="0">
-                <a:latin typeface="Times New Roman" panose="02020603050405020304" pitchFamily="18" charset="0"/>
-                <a:cs typeface="Times New Roman" panose="02020603050405020304" pitchFamily="18" charset="0"/>
-              </a:rPr>
-              <a:t>A total of </a:t>
-            </a:r>
-            <a:r>
-              <a:rPr lang="en-US" sz="1800" b="1" dirty="0">
-                <a:latin typeface="Times New Roman" panose="02020603050405020304" pitchFamily="18" charset="0"/>
-                <a:cs typeface="Times New Roman" panose="02020603050405020304" pitchFamily="18" charset="0"/>
-              </a:rPr>
-              <a:t>15 models </a:t>
-            </a:r>
-            <a:r>
-              <a:rPr lang="en-US" sz="1800" dirty="0">
-                <a:latin typeface="Times New Roman" panose="02020603050405020304" pitchFamily="18" charset="0"/>
-                <a:cs typeface="Times New Roman" panose="02020603050405020304" pitchFamily="18" charset="0"/>
-              </a:rPr>
-              <a:t>are used for each ensemble technique </a:t>
-            </a:r>
-          </a:p>
-        </p:txBody>
-      </p:sp>
-      <p:grpSp>
-        <p:nvGrpSpPr>
-          <p:cNvPr id="5" name="Group 4">
-            <a:extLst>
-              <a:ext uri="{FF2B5EF4-FFF2-40B4-BE49-F238E27FC236}">
-                <a16:creationId xmlns:a16="http://schemas.microsoft.com/office/drawing/2014/main" id="{B1190059-9CA3-491B-A6B4-4CB2216D0971}"/>
-              </a:ext>
-            </a:extLst>
-          </p:cNvPr>
-          <p:cNvGrpSpPr/>
-          <p:nvPr/>
-        </p:nvGrpSpPr>
-        <p:grpSpPr>
-          <a:xfrm>
-            <a:off x="7900797" y="1149015"/>
-            <a:ext cx="3697831" cy="2692022"/>
-            <a:chOff x="7919458" y="1419603"/>
-            <a:chExt cx="3697831" cy="2692022"/>
-          </a:xfrm>
-        </p:grpSpPr>
-        <p:pic>
-          <p:nvPicPr>
-            <p:cNvPr id="2050" name="Picture 2" descr="Image result for stacking classifier">
-              <a:extLst>
-                <a:ext uri="{FF2B5EF4-FFF2-40B4-BE49-F238E27FC236}">
-                  <a16:creationId xmlns:a16="http://schemas.microsoft.com/office/drawing/2014/main" id="{3D9811A9-CF50-46BA-80FA-5FD6DEEA2D80}"/>
-                </a:ext>
-              </a:extLst>
-            </p:cNvPr>
-            <p:cNvPicPr>
-              <a:picLocks noChangeAspect="1" noChangeArrowheads="1"/>
-            </p:cNvPicPr>
-            <p:nvPr/>
-          </p:nvPicPr>
-          <p:blipFill>
-            <a:blip r:embed="rId2">
-              <a:extLst>
-                <a:ext uri="{28A0092B-C50C-407E-A947-70E740481C1C}">
-                  <a14:useLocalDpi xmlns:a14="http://schemas.microsoft.com/office/drawing/2010/main" val="0"/>
-                </a:ext>
-              </a:extLst>
-            </a:blip>
-            <a:srcRect/>
-            <a:stretch>
-              <a:fillRect/>
-            </a:stretch>
-          </p:blipFill>
-          <p:spPr bwMode="auto">
-            <a:xfrm>
-              <a:off x="8456048" y="1825625"/>
-              <a:ext cx="3161241" cy="2286000"/>
-            </a:xfrm>
-            <a:prstGeom prst="rect">
-              <a:avLst/>
-            </a:prstGeom>
-            <a:noFill/>
-            <a:extLst>
-              <a:ext uri="{909E8E84-426E-40DD-AFC4-6F175D3DCCD1}">
-                <a14:hiddenFill xmlns:a14="http://schemas.microsoft.com/office/drawing/2010/main">
-                  <a:solidFill>
-                    <a:srgbClr val="FFFFFF"/>
-                  </a:solidFill>
-                </a14:hiddenFill>
-              </a:ext>
-            </a:extLst>
-          </p:spPr>
-        </p:pic>
-        <p:sp>
-          <p:nvSpPr>
-            <p:cNvPr id="4" name="Rectangle 3">
-              <a:extLst>
-                <a:ext uri="{FF2B5EF4-FFF2-40B4-BE49-F238E27FC236}">
-                  <a16:creationId xmlns:a16="http://schemas.microsoft.com/office/drawing/2014/main" id="{4F68E110-D532-4FAD-AD6F-2570FC8A6D67}"/>
-                </a:ext>
-              </a:extLst>
-            </p:cNvPr>
-            <p:cNvSpPr/>
-            <p:nvPr/>
-          </p:nvSpPr>
-          <p:spPr>
-            <a:xfrm>
-              <a:off x="7919458" y="1419603"/>
-              <a:ext cx="2162772" cy="338554"/>
-            </a:xfrm>
-            <a:prstGeom prst="rect">
-              <a:avLst/>
-            </a:prstGeom>
-          </p:spPr>
-          <p:txBody>
-            <a:bodyPr wrap="none">
-              <a:spAutoFit/>
-            </a:bodyPr>
-            <a:lstStyle/>
-            <a:p>
-              <a:pPr lvl="1"/>
-              <a:r>
-                <a:rPr lang="en-US" sz="1600" dirty="0">
-                  <a:latin typeface="Times New Roman" panose="02020603050405020304" pitchFamily="18" charset="0"/>
-                  <a:cs typeface="Times New Roman" panose="02020603050405020304" pitchFamily="18" charset="0"/>
-                </a:rPr>
-                <a:t>Stacking classifier</a:t>
-              </a:r>
-            </a:p>
-          </p:txBody>
-        </p:sp>
-      </p:grpSp>
-      <p:pic>
-        <p:nvPicPr>
-          <p:cNvPr id="2052" name="Picture 4" descr="Image result for voting classifier">
-            <a:extLst>
-              <a:ext uri="{FF2B5EF4-FFF2-40B4-BE49-F238E27FC236}">
-                <a16:creationId xmlns:a16="http://schemas.microsoft.com/office/drawing/2014/main" id="{E1F77B17-2BB5-433A-9A23-AF6B1FA97854}"/>
-              </a:ext>
-            </a:extLst>
-          </p:cNvPr>
-          <p:cNvPicPr>
-            <a:picLocks noChangeAspect="1" noChangeArrowheads="1"/>
-          </p:cNvPicPr>
-          <p:nvPr/>
-        </p:nvPicPr>
-        <p:blipFill>
-          <a:blip r:embed="rId3">
-            <a:extLst>
-              <a:ext uri="{28A0092B-C50C-407E-A947-70E740481C1C}">
-                <a14:useLocalDpi xmlns:a14="http://schemas.microsoft.com/office/drawing/2010/main" val="0"/>
-              </a:ext>
-            </a:extLst>
-          </a:blip>
-          <a:srcRect/>
-          <a:stretch>
-            <a:fillRect/>
-          </a:stretch>
-        </p:blipFill>
-        <p:spPr bwMode="auto">
-          <a:xfrm>
-            <a:off x="7620000" y="4512421"/>
-            <a:ext cx="4572000" cy="1739183"/>
-          </a:xfrm>
-          <a:prstGeom prst="rect">
-            <a:avLst/>
-          </a:prstGeom>
-          <a:noFill/>
-          <a:extLst>
-            <a:ext uri="{909E8E84-426E-40DD-AFC4-6F175D3DCCD1}">
-              <a14:hiddenFill xmlns:a14="http://schemas.microsoft.com/office/drawing/2010/main">
-                <a:solidFill>
-                  <a:srgbClr val="FFFFFF"/>
-                </a:solidFill>
-              </a14:hiddenFill>
-            </a:ext>
-          </a:extLst>
-        </p:spPr>
-      </p:pic>
-      <p:sp>
-        <p:nvSpPr>
-          <p:cNvPr id="6" name="Rectangle 5">
-            <a:extLst>
-              <a:ext uri="{FF2B5EF4-FFF2-40B4-BE49-F238E27FC236}">
-                <a16:creationId xmlns:a16="http://schemas.microsoft.com/office/drawing/2014/main" id="{B31F861F-8F00-41BB-ABF3-4056F9CDD92E}"/>
-              </a:ext>
-            </a:extLst>
-          </p:cNvPr>
-          <p:cNvSpPr/>
-          <p:nvPr/>
-        </p:nvSpPr>
-        <p:spPr>
-          <a:xfrm>
-            <a:off x="8437387" y="4143089"/>
-            <a:ext cx="1623265" cy="369332"/>
-          </a:xfrm>
-          <a:prstGeom prst="rect">
-            <a:avLst/>
-          </a:prstGeom>
-        </p:spPr>
-        <p:txBody>
-          <a:bodyPr wrap="none">
-            <a:spAutoFit/>
-          </a:bodyPr>
-          <a:lstStyle/>
-          <a:p>
-            <a:r>
-              <a:rPr lang="en-US" dirty="0">
-                <a:latin typeface="Times New Roman" panose="02020603050405020304" pitchFamily="18" charset="0"/>
-                <a:cs typeface="Times New Roman" panose="02020603050405020304" pitchFamily="18" charset="0"/>
-              </a:rPr>
-              <a:t>Voting </a:t>
-            </a:r>
-            <a:r>
-              <a:rPr lang="en-US" dirty="0" err="1">
-                <a:latin typeface="Times New Roman" panose="02020603050405020304" pitchFamily="18" charset="0"/>
-                <a:cs typeface="Times New Roman" panose="02020603050405020304" pitchFamily="18" charset="0"/>
-              </a:rPr>
-              <a:t>classifer</a:t>
-            </a:r>
-            <a:endParaRPr lang="en-US" dirty="0"/>
-          </a:p>
-        </p:txBody>
-      </p:sp>
-      <p:graphicFrame>
-        <p:nvGraphicFramePr>
-          <p:cNvPr id="9" name="Table 7">
-            <a:extLst>
-              <a:ext uri="{FF2B5EF4-FFF2-40B4-BE49-F238E27FC236}">
-                <a16:creationId xmlns:a16="http://schemas.microsoft.com/office/drawing/2014/main" id="{F8EEFDAA-1FC3-450A-9781-0F883B78F5C1}"/>
-              </a:ext>
-            </a:extLst>
-          </p:cNvPr>
-          <p:cNvGraphicFramePr>
-            <a:graphicFrameLocks noGrp="1"/>
-          </p:cNvGraphicFramePr>
-          <p:nvPr>
-            <p:extLst>
-              <p:ext uri="{D42A27DB-BD31-4B8C-83A1-F6EECF244321}">
-                <p14:modId xmlns:p14="http://schemas.microsoft.com/office/powerpoint/2010/main" val="1703930747"/>
-              </p:ext>
-            </p:extLst>
-          </p:nvPr>
-        </p:nvGraphicFramePr>
-        <p:xfrm>
-          <a:off x="1204761" y="5090330"/>
-          <a:ext cx="3890646" cy="1483360"/>
-        </p:xfrm>
-        <a:graphic>
-          <a:graphicData uri="http://schemas.openxmlformats.org/drawingml/2006/table">
-            <a:tbl>
-              <a:tblPr firstRow="1" bandRow="1">
-                <a:tableStyleId>{5C22544A-7EE6-4342-B048-85BDC9FD1C3A}</a:tableStyleId>
-              </a:tblPr>
-              <a:tblGrid>
-                <a:gridCol w="1336675">
-                  <a:extLst>
-                    <a:ext uri="{9D8B030D-6E8A-4147-A177-3AD203B41FA5}">
-                      <a16:colId xmlns:a16="http://schemas.microsoft.com/office/drawing/2014/main" val="1368218454"/>
-                    </a:ext>
-                  </a:extLst>
-                </a:gridCol>
-                <a:gridCol w="1323404">
-                  <a:extLst>
-                    <a:ext uri="{9D8B030D-6E8A-4147-A177-3AD203B41FA5}">
-                      <a16:colId xmlns:a16="http://schemas.microsoft.com/office/drawing/2014/main" val="3411469074"/>
-                    </a:ext>
-                  </a:extLst>
-                </a:gridCol>
-                <a:gridCol w="1230567">
-                  <a:extLst>
-                    <a:ext uri="{9D8B030D-6E8A-4147-A177-3AD203B41FA5}">
-                      <a16:colId xmlns:a16="http://schemas.microsoft.com/office/drawing/2014/main" val="1879159377"/>
-                    </a:ext>
-                  </a:extLst>
-                </a:gridCol>
-              </a:tblGrid>
-              <a:tr h="370840">
-                <a:tc>
-                  <a:txBody>
-                    <a:bodyPr/>
-                    <a:lstStyle/>
-                    <a:p>
-                      <a:endParaRPr lang="en-US" dirty="0"/>
-                    </a:p>
-                  </a:txBody>
-                  <a:tcPr/>
-                </a:tc>
-                <a:tc>
-                  <a:txBody>
-                    <a:bodyPr/>
-                    <a:lstStyle/>
-                    <a:p>
-                      <a:r>
-                        <a:rPr lang="en-US" dirty="0"/>
-                        <a:t>Training set</a:t>
-                      </a:r>
-                    </a:p>
-                  </a:txBody>
-                  <a:tcPr/>
-                </a:tc>
-                <a:tc>
-                  <a:txBody>
-                    <a:bodyPr/>
-                    <a:lstStyle/>
-                    <a:p>
-                      <a:r>
-                        <a:rPr lang="en-US" dirty="0"/>
-                        <a:t>Testing set</a:t>
-                      </a:r>
-                    </a:p>
-                  </a:txBody>
-                  <a:tcPr/>
-                </a:tc>
-                <a:extLst>
-                  <a:ext uri="{0D108BD9-81ED-4DB2-BD59-A6C34878D82A}">
-                    <a16:rowId xmlns:a16="http://schemas.microsoft.com/office/drawing/2014/main" val="2561022447"/>
-                  </a:ext>
-                </a:extLst>
-              </a:tr>
-              <a:tr h="370840">
-                <a:tc>
-                  <a:txBody>
-                    <a:bodyPr/>
-                    <a:lstStyle/>
-                    <a:p>
-                      <a:r>
-                        <a:rPr lang="en-US" dirty="0"/>
-                        <a:t>Diabetes</a:t>
-                      </a:r>
-                    </a:p>
-                  </a:txBody>
-                  <a:tcPr/>
-                </a:tc>
-                <a:tc>
-                  <a:txBody>
-                    <a:bodyPr/>
-                    <a:lstStyle/>
-                    <a:p>
-                      <a:r>
-                        <a:rPr lang="en-US" dirty="0"/>
-                        <a:t>20,315 </a:t>
-                      </a:r>
-                    </a:p>
-                  </a:txBody>
-                  <a:tcPr/>
-                </a:tc>
-                <a:tc>
-                  <a:txBody>
-                    <a:bodyPr/>
-                    <a:lstStyle/>
-                    <a:p>
-                      <a:r>
-                        <a:rPr lang="en-US" dirty="0"/>
-                        <a:t>200</a:t>
-                      </a:r>
-                    </a:p>
-                  </a:txBody>
-                  <a:tcPr/>
-                </a:tc>
-                <a:extLst>
-                  <a:ext uri="{0D108BD9-81ED-4DB2-BD59-A6C34878D82A}">
-                    <a16:rowId xmlns:a16="http://schemas.microsoft.com/office/drawing/2014/main" val="679388349"/>
-                  </a:ext>
-                </a:extLst>
-              </a:tr>
-              <a:tr h="370840">
-                <a:tc>
-                  <a:txBody>
-                    <a:bodyPr/>
-                    <a:lstStyle/>
-                    <a:p>
-                      <a:r>
-                        <a:rPr lang="en-US" dirty="0"/>
-                        <a:t>Prediabetes</a:t>
-                      </a:r>
-                    </a:p>
-                  </a:txBody>
-                  <a:tcPr/>
-                </a:tc>
-                <a:tc>
-                  <a:txBody>
-                    <a:bodyPr/>
-                    <a:lstStyle/>
-                    <a:p>
-                      <a:r>
-                        <a:rPr lang="en-US" dirty="0"/>
-                        <a:t>20,315 </a:t>
-                      </a:r>
-                    </a:p>
-                  </a:txBody>
-                  <a:tcPr/>
-                </a:tc>
-                <a:tc>
-                  <a:txBody>
-                    <a:bodyPr/>
-                    <a:lstStyle/>
-                    <a:p>
-                      <a:r>
-                        <a:rPr lang="en-US" dirty="0"/>
-                        <a:t>200</a:t>
-                      </a:r>
-                    </a:p>
-                  </a:txBody>
-                  <a:tcPr/>
-                </a:tc>
-                <a:extLst>
-                  <a:ext uri="{0D108BD9-81ED-4DB2-BD59-A6C34878D82A}">
-                    <a16:rowId xmlns:a16="http://schemas.microsoft.com/office/drawing/2014/main" val="1139918692"/>
-                  </a:ext>
-                </a:extLst>
-              </a:tr>
-              <a:tr h="370840">
-                <a:tc>
-                  <a:txBody>
-                    <a:bodyPr/>
-                    <a:lstStyle/>
-                    <a:p>
-                      <a:r>
-                        <a:rPr lang="en-US" dirty="0"/>
-                        <a:t>Normal</a:t>
-                      </a:r>
-                    </a:p>
-                  </a:txBody>
-                  <a:tcPr/>
-                </a:tc>
-                <a:tc>
-                  <a:txBody>
-                    <a:bodyPr/>
-                    <a:lstStyle/>
-                    <a:p>
-                      <a:r>
-                        <a:rPr lang="en-US" dirty="0"/>
-                        <a:t>20,315 </a:t>
-                      </a:r>
-                    </a:p>
-                  </a:txBody>
-                  <a:tcPr/>
-                </a:tc>
-                <a:tc>
-                  <a:txBody>
-                    <a:bodyPr/>
-                    <a:lstStyle/>
-                    <a:p>
-                      <a:r>
-                        <a:rPr lang="en-US" dirty="0"/>
-                        <a:t>200</a:t>
-                      </a:r>
-                    </a:p>
-                  </a:txBody>
-                  <a:tcPr/>
-                </a:tc>
-                <a:extLst>
-                  <a:ext uri="{0D108BD9-81ED-4DB2-BD59-A6C34878D82A}">
-                    <a16:rowId xmlns:a16="http://schemas.microsoft.com/office/drawing/2014/main" val="339788541"/>
-                  </a:ext>
-                </a:extLst>
-              </a:tr>
-            </a:tbl>
-          </a:graphicData>
-        </a:graphic>
-      </p:graphicFrame>
-    </p:spTree>
-    <p:extLst>
-      <p:ext uri="{BB962C8B-B14F-4D97-AF65-F5344CB8AC3E}">
-        <p14:creationId xmlns:p14="http://schemas.microsoft.com/office/powerpoint/2010/main" val="2861797823"/>
-      </p:ext>
-    </p:extLst>
-  </p:cSld>
-  <p:clrMapOvr>
-    <a:masterClrMapping/>
-  </p:clrMapOvr>
-</p:sld>
-</file>
-
 <file path=ppt/theme/theme1.xml><?xml version="1.0" encoding="utf-8"?>
 <a:theme xmlns:a="http://schemas.openxmlformats.org/drawingml/2006/main" name="Office Theme">
   <a:themeElements>

</xml_diff>